<commit_message>
Submitted the final pitch and finished class. Good job goggy, one more class to go!
</commit_message>
<xml_diff>
--- a/MGT5824-Tech-based Entrepreneurship/Assignments/Final Venture Concept Pitch/gasser18-final_pitch_slides.pptx
+++ b/MGT5824-Tech-based Entrepreneurship/Assignments/Final Venture Concept Pitch/gasser18-final_pitch_slides.pptx
@@ -25,7 +25,7 @@
   <p:notesSz cx="6858000" cy="9144000"/>
   <p:embeddedFontLst>
     <p:embeddedFont>
-      <p:font typeface="Bungee" panose="020B0604020202020204" charset="0"/>
+      <p:font typeface="Bungee" panose="020B0604020202020204" pitchFamily="34" charset="0"/>
       <p:regular r:id="rId15"/>
     </p:embeddedFont>
     <p:embeddedFont>
@@ -43,28 +43,28 @@
       <p:boldItalic r:id="rId23"/>
     </p:embeddedFont>
     <p:embeddedFont>
-      <p:font typeface="Poppins" panose="00000500000000000000" pitchFamily="2" charset="0"/>
+      <p:font typeface="Poppins" pitchFamily="2" charset="77"/>
       <p:regular r:id="rId24"/>
       <p:bold r:id="rId25"/>
       <p:italic r:id="rId26"/>
       <p:boldItalic r:id="rId27"/>
     </p:embeddedFont>
     <p:embeddedFont>
-      <p:font typeface="Poppins SemiBold" panose="00000700000000000000" pitchFamily="2" charset="0"/>
+      <p:font typeface="Poppins SemiBold" panose="020B0604020202020204" pitchFamily="34" charset="0"/>
       <p:regular r:id="rId28"/>
       <p:bold r:id="rId29"/>
       <p:italic r:id="rId30"/>
       <p:boldItalic r:id="rId31"/>
     </p:embeddedFont>
     <p:embeddedFont>
-      <p:font typeface="PT Sans" panose="020B0503020203020204" pitchFamily="34" charset="0"/>
+      <p:font typeface="PT Sans" panose="020B0503020203020204" pitchFamily="34" charset="77"/>
       <p:regular r:id="rId32"/>
       <p:bold r:id="rId33"/>
       <p:italic r:id="rId34"/>
       <p:boldItalic r:id="rId35"/>
     </p:embeddedFont>
     <p:embeddedFont>
-      <p:font typeface="Roboto Condensed Light" panose="02000000000000000000" pitchFamily="2" charset="0"/>
+      <p:font typeface="Roboto Condensed Light" panose="020F0302020204030204" pitchFamily="34" charset="0"/>
       <p:regular r:id="rId36"/>
       <p:italic r:id="rId37"/>
     </p:embeddedFont>
@@ -28675,10 +28675,17 @@
               </a:lnSpc>
             </a:pPr>
             <a:r>
-              <a:rPr lang="en-US" sz="1800" dirty="0"/>
+              <a:rPr lang="en-US" sz="1800" dirty="0">
+                <a:solidFill>
+                  <a:schemeClr val="tx1"/>
+                </a:solidFill>
+              </a:rPr>
               <a:t>Growth &amp; Strategy &amp; Funding Needs</a:t>
             </a:r>
             <a:endParaRPr sz="2000" dirty="0">
+              <a:solidFill>
+                <a:schemeClr val="tx1"/>
+              </a:solidFill>
               <a:latin typeface="Poppins" panose="00000500000000000000" pitchFamily="2" charset="0"/>
               <a:cs typeface="Poppins" panose="00000500000000000000" pitchFamily="2" charset="0"/>
             </a:endParaRPr>
@@ -28739,6 +28746,9 @@
               </a:pPr>
               <a:r>
                 <a:rPr lang="en-US" sz="750" b="1" dirty="0">
+                  <a:solidFill>
+                    <a:schemeClr val="tx1"/>
+                  </a:solidFill>
                   <a:latin typeface="Lato" panose="020F0502020204030203" pitchFamily="34" charset="0"/>
                   <a:ea typeface="Lato" panose="020F0502020204030203" pitchFamily="34" charset="0"/>
                   <a:cs typeface="Lato" panose="020F0502020204030203" pitchFamily="34" charset="0"/>
@@ -28747,6 +28757,9 @@
               </a:r>
               <a:r>
                 <a:rPr lang="en-US" sz="750" dirty="0">
+                  <a:solidFill>
+                    <a:schemeClr val="tx1"/>
+                  </a:solidFill>
                   <a:latin typeface="Lato" panose="020F0502020204030203" pitchFamily="34" charset="0"/>
                   <a:ea typeface="Lato" panose="020F0502020204030203" pitchFamily="34" charset="0"/>
                   <a:cs typeface="Lato" panose="020F0502020204030203" pitchFamily="34" charset="0"/>
@@ -28760,6 +28773,9 @@
                 <a:buAutoNum type="arabicPeriod"/>
               </a:pPr>
               <a:endParaRPr lang="en-US" sz="750" dirty="0">
+                <a:solidFill>
+                  <a:schemeClr val="tx1"/>
+                </a:solidFill>
                 <a:latin typeface="Lato" panose="020F0502020204030203" pitchFamily="34" charset="0"/>
                 <a:ea typeface="Lato" panose="020F0502020204030203" pitchFamily="34" charset="0"/>
                 <a:cs typeface="Lato" panose="020F0502020204030203" pitchFamily="34" charset="0"/>
@@ -28772,6 +28788,9 @@
               </a:pPr>
               <a:r>
                 <a:rPr lang="en-US" sz="750" b="1" dirty="0">
+                  <a:solidFill>
+                    <a:schemeClr val="tx1"/>
+                  </a:solidFill>
                   <a:latin typeface="Lato" panose="020F0502020204030203" pitchFamily="34" charset="0"/>
                   <a:ea typeface="Lato" panose="020F0502020204030203" pitchFamily="34" charset="0"/>
                   <a:cs typeface="Lato" panose="020F0502020204030203" pitchFamily="34" charset="0"/>
@@ -28780,6 +28799,9 @@
               </a:r>
               <a:r>
                 <a:rPr lang="en-US" sz="750" dirty="0">
+                  <a:solidFill>
+                    <a:schemeClr val="tx1"/>
+                  </a:solidFill>
                   <a:latin typeface="Lato" panose="020F0502020204030203" pitchFamily="34" charset="0"/>
                   <a:ea typeface="Lato" panose="020F0502020204030203" pitchFamily="34" charset="0"/>
                   <a:cs typeface="Lato" panose="020F0502020204030203" pitchFamily="34" charset="0"/>
@@ -28793,6 +28815,9 @@
                 <a:buAutoNum type="arabicPeriod"/>
               </a:pPr>
               <a:endParaRPr lang="en-US" sz="750" dirty="0">
+                <a:solidFill>
+                  <a:schemeClr val="tx1"/>
+                </a:solidFill>
                 <a:latin typeface="Lato" panose="020F0502020204030203" pitchFamily="34" charset="0"/>
                 <a:ea typeface="Lato" panose="020F0502020204030203" pitchFamily="34" charset="0"/>
                 <a:cs typeface="Lato" panose="020F0502020204030203" pitchFamily="34" charset="0"/>
@@ -28805,6 +28830,9 @@
               </a:pPr>
               <a:r>
                 <a:rPr lang="en-US" sz="750" b="1" dirty="0">
+                  <a:solidFill>
+                    <a:schemeClr val="tx1"/>
+                  </a:solidFill>
                   <a:latin typeface="Lato" panose="020F0502020204030203" pitchFamily="34" charset="0"/>
                   <a:ea typeface="Lato" panose="020F0502020204030203" pitchFamily="34" charset="0"/>
                   <a:cs typeface="Lato" panose="020F0502020204030203" pitchFamily="34" charset="0"/>
@@ -28813,6 +28841,9 @@
               </a:r>
               <a:r>
                 <a:rPr lang="en-US" sz="750" dirty="0">
+                  <a:solidFill>
+                    <a:schemeClr val="tx1"/>
+                  </a:solidFill>
                   <a:latin typeface="Lato" panose="020F0502020204030203" pitchFamily="34" charset="0"/>
                   <a:ea typeface="Lato" panose="020F0502020204030203" pitchFamily="34" charset="0"/>
                   <a:cs typeface="Lato" panose="020F0502020204030203" pitchFamily="34" charset="0"/>
@@ -28826,6 +28857,9 @@
                 <a:buAutoNum type="arabicPeriod"/>
               </a:pPr>
               <a:endParaRPr lang="en-US" sz="750" dirty="0">
+                <a:solidFill>
+                  <a:schemeClr val="tx1"/>
+                </a:solidFill>
                 <a:latin typeface="Lato" panose="020F0502020204030203" pitchFamily="34" charset="0"/>
                 <a:ea typeface="Lato" panose="020F0502020204030203" pitchFamily="34" charset="0"/>
                 <a:cs typeface="Lato" panose="020F0502020204030203" pitchFamily="34" charset="0"/>
@@ -28838,6 +28872,9 @@
               </a:pPr>
               <a:r>
                 <a:rPr lang="en-US" sz="750" b="1" dirty="0">
+                  <a:solidFill>
+                    <a:schemeClr val="tx1"/>
+                  </a:solidFill>
                   <a:latin typeface="Lato" panose="020F0502020204030203" pitchFamily="34" charset="0"/>
                   <a:ea typeface="Lato" panose="020F0502020204030203" pitchFamily="34" charset="0"/>
                   <a:cs typeface="Lato" panose="020F0502020204030203" pitchFamily="34" charset="0"/>
@@ -28846,6 +28883,9 @@
               </a:r>
               <a:r>
                 <a:rPr lang="en-US" sz="750" dirty="0">
+                  <a:solidFill>
+                    <a:schemeClr val="tx1"/>
+                  </a:solidFill>
                   <a:latin typeface="Lato" panose="020F0502020204030203" pitchFamily="34" charset="0"/>
                   <a:ea typeface="Lato" panose="020F0502020204030203" pitchFamily="34" charset="0"/>
                   <a:cs typeface="Lato" panose="020F0502020204030203" pitchFamily="34" charset="0"/>
@@ -28859,6 +28899,9 @@
                 <a:buAutoNum type="arabicPeriod"/>
               </a:pPr>
               <a:endParaRPr lang="en-US" sz="750" dirty="0">
+                <a:solidFill>
+                  <a:schemeClr val="tx1"/>
+                </a:solidFill>
                 <a:latin typeface="Lato" panose="020F0502020204030203" pitchFamily="34" charset="0"/>
                 <a:ea typeface="Lato" panose="020F0502020204030203" pitchFamily="34" charset="0"/>
                 <a:cs typeface="Lato" panose="020F0502020204030203" pitchFamily="34" charset="0"/>
@@ -28871,6 +28914,9 @@
               </a:pPr>
               <a:r>
                 <a:rPr lang="en-US" sz="750" b="1" dirty="0">
+                  <a:solidFill>
+                    <a:schemeClr val="tx1"/>
+                  </a:solidFill>
                   <a:latin typeface="Lato" panose="020F0502020204030203" pitchFamily="34" charset="0"/>
                   <a:ea typeface="Lato" panose="020F0502020204030203" pitchFamily="34" charset="0"/>
                   <a:cs typeface="Lato" panose="020F0502020204030203" pitchFamily="34" charset="0"/>
@@ -28879,6 +28925,9 @@
               </a:r>
               <a:r>
                 <a:rPr lang="en-US" sz="750" dirty="0">
+                  <a:solidFill>
+                    <a:schemeClr val="tx1"/>
+                  </a:solidFill>
                   <a:latin typeface="Lato" panose="020F0502020204030203" pitchFamily="34" charset="0"/>
                   <a:ea typeface="Lato" panose="020F0502020204030203" pitchFamily="34" charset="0"/>
                   <a:cs typeface="Lato" panose="020F0502020204030203" pitchFamily="34" charset="0"/>
@@ -29170,6 +29219,9 @@
               <a:pPr marL="0" indent="0" algn="l"/>
               <a:r>
                 <a:rPr lang="en-US" sz="1600" dirty="0">
+                  <a:solidFill>
+                    <a:schemeClr val="tx1"/>
+                  </a:solidFill>
                   <a:latin typeface="Poppins" panose="00000500000000000000" pitchFamily="2" charset="0"/>
                   <a:cs typeface="Poppins" panose="00000500000000000000" pitchFamily="2" charset="0"/>
                 </a:rPr>
@@ -29233,6 +29285,9 @@
               </a:pPr>
               <a:r>
                 <a:rPr lang="en-US" sz="750" b="1" dirty="0">
+                  <a:solidFill>
+                    <a:schemeClr val="tx1"/>
+                  </a:solidFill>
                   <a:latin typeface="Lato" panose="020F0502020204030203" pitchFamily="34" charset="0"/>
                   <a:ea typeface="Lato" panose="020F0502020204030203" pitchFamily="34" charset="0"/>
                   <a:cs typeface="Lato" panose="020F0502020204030203" pitchFamily="34" charset="0"/>
@@ -29241,6 +29296,9 @@
               </a:r>
               <a:r>
                 <a:rPr lang="en-US" sz="750" dirty="0">
+                  <a:solidFill>
+                    <a:schemeClr val="tx1"/>
+                  </a:solidFill>
                   <a:latin typeface="Lato" panose="020F0502020204030203" pitchFamily="34" charset="0"/>
                   <a:ea typeface="Lato" panose="020F0502020204030203" pitchFamily="34" charset="0"/>
                   <a:cs typeface="Lato" panose="020F0502020204030203" pitchFamily="34" charset="0"/>
@@ -29254,6 +29312,9 @@
                 <a:buAutoNum type="arabicPeriod"/>
               </a:pPr>
               <a:endParaRPr lang="en-US" sz="750" dirty="0">
+                <a:solidFill>
+                  <a:schemeClr val="tx1"/>
+                </a:solidFill>
                 <a:latin typeface="Lato" panose="020F0502020204030203" pitchFamily="34" charset="0"/>
                 <a:ea typeface="Lato" panose="020F0502020204030203" pitchFamily="34" charset="0"/>
                 <a:cs typeface="Lato" panose="020F0502020204030203" pitchFamily="34" charset="0"/>
@@ -29266,6 +29327,9 @@
               </a:pPr>
               <a:r>
                 <a:rPr lang="en-US" sz="750" b="1" dirty="0">
+                  <a:solidFill>
+                    <a:schemeClr val="tx1"/>
+                  </a:solidFill>
                   <a:latin typeface="Lato" panose="020F0502020204030203" pitchFamily="34" charset="0"/>
                   <a:ea typeface="Lato" panose="020F0502020204030203" pitchFamily="34" charset="0"/>
                   <a:cs typeface="Lato" panose="020F0502020204030203" pitchFamily="34" charset="0"/>
@@ -29274,6 +29338,9 @@
               </a:r>
               <a:r>
                 <a:rPr lang="en-US" sz="750" dirty="0">
+                  <a:solidFill>
+                    <a:schemeClr val="tx1"/>
+                  </a:solidFill>
                   <a:latin typeface="Lato" panose="020F0502020204030203" pitchFamily="34" charset="0"/>
                   <a:ea typeface="Lato" panose="020F0502020204030203" pitchFamily="34" charset="0"/>
                   <a:cs typeface="Lato" panose="020F0502020204030203" pitchFamily="34" charset="0"/>
@@ -29287,6 +29354,9 @@
                 <a:buAutoNum type="arabicPeriod"/>
               </a:pPr>
               <a:endParaRPr lang="en-US" sz="750" dirty="0">
+                <a:solidFill>
+                  <a:schemeClr val="tx1"/>
+                </a:solidFill>
                 <a:latin typeface="Lato" panose="020F0502020204030203" pitchFamily="34" charset="0"/>
                 <a:ea typeface="Lato" panose="020F0502020204030203" pitchFamily="34" charset="0"/>
                 <a:cs typeface="Lato" panose="020F0502020204030203" pitchFamily="34" charset="0"/>
@@ -29299,6 +29369,9 @@
               </a:pPr>
               <a:r>
                 <a:rPr lang="en-US" sz="750" b="1" dirty="0">
+                  <a:solidFill>
+                    <a:schemeClr val="tx1"/>
+                  </a:solidFill>
                   <a:latin typeface="Lato" panose="020F0502020204030203" pitchFamily="34" charset="0"/>
                   <a:ea typeface="Lato" panose="020F0502020204030203" pitchFamily="34" charset="0"/>
                   <a:cs typeface="Lato" panose="020F0502020204030203" pitchFamily="34" charset="0"/>
@@ -29307,6 +29380,9 @@
               </a:r>
               <a:r>
                 <a:rPr lang="en-US" sz="750" dirty="0">
+                  <a:solidFill>
+                    <a:schemeClr val="tx1"/>
+                  </a:solidFill>
                   <a:latin typeface="Lato" panose="020F0502020204030203" pitchFamily="34" charset="0"/>
                   <a:ea typeface="Lato" panose="020F0502020204030203" pitchFamily="34" charset="0"/>
                   <a:cs typeface="Lato" panose="020F0502020204030203" pitchFamily="34" charset="0"/>
@@ -29320,6 +29396,9 @@
                 <a:buAutoNum type="arabicPeriod"/>
               </a:pPr>
               <a:endParaRPr lang="en-US" sz="750" dirty="0">
+                <a:solidFill>
+                  <a:schemeClr val="tx1"/>
+                </a:solidFill>
                 <a:latin typeface="Lato" panose="020F0502020204030203" pitchFamily="34" charset="0"/>
                 <a:ea typeface="Lato" panose="020F0502020204030203" pitchFamily="34" charset="0"/>
                 <a:cs typeface="Lato" panose="020F0502020204030203" pitchFamily="34" charset="0"/>
@@ -29332,6 +29411,9 @@
               </a:pPr>
               <a:r>
                 <a:rPr lang="en-US" sz="750" b="1" dirty="0">
+                  <a:solidFill>
+                    <a:schemeClr val="tx1"/>
+                  </a:solidFill>
                   <a:latin typeface="Lato" panose="020F0502020204030203" pitchFamily="34" charset="0"/>
                   <a:ea typeface="Lato" panose="020F0502020204030203" pitchFamily="34" charset="0"/>
                   <a:cs typeface="Lato" panose="020F0502020204030203" pitchFamily="34" charset="0"/>
@@ -29340,6 +29422,9 @@
               </a:r>
               <a:r>
                 <a:rPr lang="en-US" sz="750" dirty="0">
+                  <a:solidFill>
+                    <a:schemeClr val="tx1"/>
+                  </a:solidFill>
                   <a:latin typeface="Lato" panose="020F0502020204030203" pitchFamily="34" charset="0"/>
                   <a:ea typeface="Lato" panose="020F0502020204030203" pitchFamily="34" charset="0"/>
                   <a:cs typeface="Lato" panose="020F0502020204030203" pitchFamily="34" charset="0"/>
@@ -29353,6 +29438,9 @@
                 <a:buAutoNum type="arabicPeriod"/>
               </a:pPr>
               <a:endParaRPr lang="en-US" sz="750" dirty="0">
+                <a:solidFill>
+                  <a:schemeClr val="tx1"/>
+                </a:solidFill>
                 <a:latin typeface="Lato" panose="020F0502020204030203" pitchFamily="34" charset="0"/>
                 <a:ea typeface="Lato" panose="020F0502020204030203" pitchFamily="34" charset="0"/>
                 <a:cs typeface="Lato" panose="020F0502020204030203" pitchFamily="34" charset="0"/>
@@ -29365,6 +29453,9 @@
               </a:pPr>
               <a:r>
                 <a:rPr lang="en-US" sz="750" b="1" dirty="0">
+                  <a:solidFill>
+                    <a:schemeClr val="tx1"/>
+                  </a:solidFill>
                   <a:latin typeface="Lato" panose="020F0502020204030203" pitchFamily="34" charset="0"/>
                   <a:ea typeface="Lato" panose="020F0502020204030203" pitchFamily="34" charset="0"/>
                   <a:cs typeface="Lato" panose="020F0502020204030203" pitchFamily="34" charset="0"/>
@@ -29373,6 +29464,9 @@
               </a:r>
               <a:r>
                 <a:rPr lang="en-US" sz="750" dirty="0">
+                  <a:solidFill>
+                    <a:schemeClr val="tx1"/>
+                  </a:solidFill>
                   <a:latin typeface="Lato" panose="020F0502020204030203" pitchFamily="34" charset="0"/>
                   <a:ea typeface="Lato" panose="020F0502020204030203" pitchFamily="34" charset="0"/>
                   <a:cs typeface="Lato" panose="020F0502020204030203" pitchFamily="34" charset="0"/>
@@ -29664,6 +29758,9 @@
               <a:pPr marL="0" indent="0" algn="l"/>
               <a:r>
                 <a:rPr lang="en-US" sz="1600" dirty="0">
+                  <a:solidFill>
+                    <a:schemeClr val="tx1"/>
+                  </a:solidFill>
                   <a:latin typeface="Poppins" panose="00000500000000000000" pitchFamily="2" charset="0"/>
                   <a:cs typeface="Poppins" panose="00000500000000000000" pitchFamily="2" charset="0"/>
                 </a:rPr>
@@ -29723,6 +29820,9 @@
             <a:p>
               <a:r>
                 <a:rPr lang="en-US" sz="750" dirty="0">
+                  <a:solidFill>
+                    <a:schemeClr val="tx1"/>
+                  </a:solidFill>
                   <a:latin typeface="Lato" panose="020F0502020204030203" pitchFamily="34" charset="0"/>
                   <a:ea typeface="Lato" panose="020F0502020204030203" pitchFamily="34" charset="0"/>
                   <a:cs typeface="Lato" panose="020F0502020204030203" pitchFamily="34" charset="0"/>
@@ -29737,6 +29837,9 @@
               </a:pPr>
               <a:r>
                 <a:rPr lang="en-US" sz="750" dirty="0">
+                  <a:solidFill>
+                    <a:schemeClr val="tx1"/>
+                  </a:solidFill>
                   <a:latin typeface="Lato" panose="020F0502020204030203" pitchFamily="34" charset="0"/>
                   <a:ea typeface="Lato" panose="020F0502020204030203" pitchFamily="34" charset="0"/>
                   <a:cs typeface="Lato" panose="020F0502020204030203" pitchFamily="34" charset="0"/>
@@ -29751,6 +29854,9 @@
               </a:pPr>
               <a:r>
                 <a:rPr lang="en-US" sz="750" dirty="0">
+                  <a:solidFill>
+                    <a:schemeClr val="tx1"/>
+                  </a:solidFill>
                   <a:latin typeface="Lato" panose="020F0502020204030203" pitchFamily="34" charset="0"/>
                   <a:ea typeface="Lato" panose="020F0502020204030203" pitchFamily="34" charset="0"/>
                   <a:cs typeface="Lato" panose="020F0502020204030203" pitchFamily="34" charset="0"/>
@@ -29759,6 +29865,9 @@
               </a:r>
               <a:r>
                 <a:rPr lang="en-US" sz="750" b="1" dirty="0">
+                  <a:solidFill>
+                    <a:schemeClr val="tx1"/>
+                  </a:solidFill>
                   <a:highlight>
                     <a:srgbClr val="FFFF00"/>
                   </a:highlight>
@@ -29775,6 +29884,9 @@
                 <a:buChar char="•"/>
               </a:pPr>
               <a:endParaRPr lang="en-US" sz="750" dirty="0">
+                <a:solidFill>
+                  <a:schemeClr val="tx1"/>
+                </a:solidFill>
                 <a:latin typeface="Lato" panose="020F0502020204030203" pitchFamily="34" charset="0"/>
                 <a:ea typeface="Lato" panose="020F0502020204030203" pitchFamily="34" charset="0"/>
                 <a:cs typeface="Lato" panose="020F0502020204030203" pitchFamily="34" charset="0"/>
@@ -29786,6 +29898,9 @@
                 <a:buAutoNum type="arabicPeriod"/>
               </a:pPr>
               <a:endParaRPr lang="en-US" sz="750" b="1" dirty="0">
+                <a:solidFill>
+                  <a:schemeClr val="tx1"/>
+                </a:solidFill>
                 <a:latin typeface="Lato" panose="020F0502020204030203" pitchFamily="34" charset="0"/>
                 <a:ea typeface="Lato" panose="020F0502020204030203" pitchFamily="34" charset="0"/>
                 <a:cs typeface="Lato" panose="020F0502020204030203" pitchFamily="34" charset="0"/>
@@ -29798,6 +29913,9 @@
               </a:pPr>
               <a:r>
                 <a:rPr lang="en-US" sz="750" b="1" dirty="0">
+                  <a:solidFill>
+                    <a:schemeClr val="tx1"/>
+                  </a:solidFill>
                   <a:latin typeface="Lato" panose="020F0502020204030203" pitchFamily="34" charset="0"/>
                   <a:ea typeface="Lato" panose="020F0502020204030203" pitchFamily="34" charset="0"/>
                   <a:cs typeface="Lato" panose="020F0502020204030203" pitchFamily="34" charset="0"/>
@@ -29806,6 +29924,9 @@
               </a:r>
               <a:r>
                 <a:rPr lang="en-US" sz="750" dirty="0">
+                  <a:solidFill>
+                    <a:schemeClr val="tx1"/>
+                  </a:solidFill>
                   <a:latin typeface="Lato" panose="020F0502020204030203" pitchFamily="34" charset="0"/>
                   <a:ea typeface="Lato" panose="020F0502020204030203" pitchFamily="34" charset="0"/>
                   <a:cs typeface="Lato" panose="020F0502020204030203" pitchFamily="34" charset="0"/>
@@ -29819,6 +29940,9 @@
                 <a:buAutoNum type="arabicPeriod"/>
               </a:pPr>
               <a:endParaRPr lang="en-US" sz="750" dirty="0">
+                <a:solidFill>
+                  <a:schemeClr val="tx1"/>
+                </a:solidFill>
                 <a:latin typeface="Lato" panose="020F0502020204030203" pitchFamily="34" charset="0"/>
                 <a:ea typeface="Lato" panose="020F0502020204030203" pitchFamily="34" charset="0"/>
                 <a:cs typeface="Lato" panose="020F0502020204030203" pitchFamily="34" charset="0"/>
@@ -29831,6 +29955,9 @@
               </a:pPr>
               <a:r>
                 <a:rPr lang="en-US" sz="750" b="1" dirty="0">
+                  <a:solidFill>
+                    <a:schemeClr val="tx1"/>
+                  </a:solidFill>
                   <a:latin typeface="Lato" panose="020F0502020204030203" pitchFamily="34" charset="0"/>
                   <a:ea typeface="Lato" panose="020F0502020204030203" pitchFamily="34" charset="0"/>
                   <a:cs typeface="Lato" panose="020F0502020204030203" pitchFamily="34" charset="0"/>
@@ -29839,6 +29966,9 @@
               </a:r>
               <a:r>
                 <a:rPr lang="en-US" sz="750" dirty="0">
+                  <a:solidFill>
+                    <a:schemeClr val="tx1"/>
+                  </a:solidFill>
                   <a:latin typeface="Lato" panose="020F0502020204030203" pitchFamily="34" charset="0"/>
                   <a:ea typeface="Lato" panose="020F0502020204030203" pitchFamily="34" charset="0"/>
                   <a:cs typeface="Lato" panose="020F0502020204030203" pitchFamily="34" charset="0"/>
@@ -29852,6 +29982,9 @@
                 <a:buAutoNum type="arabicPeriod"/>
               </a:pPr>
               <a:endParaRPr lang="en-US" sz="750" dirty="0">
+                <a:solidFill>
+                  <a:schemeClr val="tx1"/>
+                </a:solidFill>
                 <a:latin typeface="Lato" panose="020F0502020204030203" pitchFamily="34" charset="0"/>
                 <a:ea typeface="Lato" panose="020F0502020204030203" pitchFamily="34" charset="0"/>
                 <a:cs typeface="Lato" panose="020F0502020204030203" pitchFamily="34" charset="0"/>
@@ -29864,6 +29997,9 @@
               </a:pPr>
               <a:r>
                 <a:rPr lang="en-US" sz="750" b="1" dirty="0">
+                  <a:solidFill>
+                    <a:schemeClr val="tx1"/>
+                  </a:solidFill>
                   <a:latin typeface="Lato" panose="020F0502020204030203" pitchFamily="34" charset="0"/>
                   <a:ea typeface="Lato" panose="020F0502020204030203" pitchFamily="34" charset="0"/>
                   <a:cs typeface="Lato" panose="020F0502020204030203" pitchFamily="34" charset="0"/>
@@ -29872,6 +30008,9 @@
               </a:r>
               <a:r>
                 <a:rPr lang="en-US" sz="750" dirty="0">
+                  <a:solidFill>
+                    <a:schemeClr val="tx1"/>
+                  </a:solidFill>
                   <a:latin typeface="Lato" panose="020F0502020204030203" pitchFamily="34" charset="0"/>
                   <a:ea typeface="Lato" panose="020F0502020204030203" pitchFamily="34" charset="0"/>
                   <a:cs typeface="Lato" panose="020F0502020204030203" pitchFamily="34" charset="0"/>
@@ -29885,6 +30024,9 @@
                 <a:buAutoNum type="arabicPeriod"/>
               </a:pPr>
               <a:endParaRPr lang="en-US" sz="750" dirty="0">
+                <a:solidFill>
+                  <a:schemeClr val="tx1"/>
+                </a:solidFill>
                 <a:latin typeface="Lato" panose="020F0502020204030203" pitchFamily="34" charset="0"/>
                 <a:ea typeface="Lato" panose="020F0502020204030203" pitchFamily="34" charset="0"/>
                 <a:cs typeface="Lato" panose="020F0502020204030203" pitchFamily="34" charset="0"/>
@@ -29897,6 +30039,9 @@
               </a:pPr>
               <a:r>
                 <a:rPr lang="en-US" sz="750" b="1" dirty="0">
+                  <a:solidFill>
+                    <a:schemeClr val="tx1"/>
+                  </a:solidFill>
                   <a:latin typeface="Lato" panose="020F0502020204030203" pitchFamily="34" charset="0"/>
                   <a:ea typeface="Lato" panose="020F0502020204030203" pitchFamily="34" charset="0"/>
                   <a:cs typeface="Lato" panose="020F0502020204030203" pitchFamily="34" charset="0"/>
@@ -29905,6 +30050,9 @@
               </a:r>
               <a:r>
                 <a:rPr lang="en-US" sz="750" dirty="0">
+                  <a:solidFill>
+                    <a:schemeClr val="tx1"/>
+                  </a:solidFill>
                   <a:latin typeface="Lato" panose="020F0502020204030203" pitchFamily="34" charset="0"/>
                   <a:ea typeface="Lato" panose="020F0502020204030203" pitchFamily="34" charset="0"/>
                   <a:cs typeface="Lato" panose="020F0502020204030203" pitchFamily="34" charset="0"/>
@@ -30196,6 +30344,9 @@
               <a:pPr marL="0" indent="0" algn="l"/>
               <a:r>
                 <a:rPr lang="en-US" sz="1600" dirty="0">
+                  <a:solidFill>
+                    <a:schemeClr val="tx1"/>
+                  </a:solidFill>
                   <a:latin typeface="Poppins" panose="00000500000000000000" pitchFamily="2" charset="0"/>
                   <a:cs typeface="Poppins" panose="00000500000000000000" pitchFamily="2" charset="0"/>
                 </a:rPr>
@@ -30366,148 +30517,6 @@
       </p:grpSpPr>
       <p:sp>
         <p:nvSpPr>
-          <p:cNvPr id="29" name="Google Shape;235;p36">
-            <a:extLst>
-              <a:ext uri="{FF2B5EF4-FFF2-40B4-BE49-F238E27FC236}">
-                <a16:creationId xmlns:a16="http://schemas.microsoft.com/office/drawing/2014/main" id="{F5203E10-1CBD-153A-62CC-DA49A47F9F8A}"/>
-              </a:ext>
-            </a:extLst>
-          </p:cNvPr>
-          <p:cNvSpPr/>
-          <p:nvPr/>
-        </p:nvSpPr>
-        <p:spPr>
-          <a:xfrm>
-            <a:off x="2459577" y="1657861"/>
-            <a:ext cx="766200" cy="762000"/>
-          </a:xfrm>
-          <a:prstGeom prst="roundRect">
-            <a:avLst>
-              <a:gd name="adj" fmla="val 16667"/>
-            </a:avLst>
-          </a:prstGeom>
-          <a:solidFill>
-            <a:schemeClr val="lt2"/>
-          </a:solidFill>
-          <a:ln>
-            <a:noFill/>
-          </a:ln>
-        </p:spPr>
-        <p:txBody>
-          <a:bodyPr spcFirstLastPara="1" wrap="square" lIns="91425" tIns="91425" rIns="91425" bIns="91425" anchor="ctr" anchorCtr="0">
-            <a:noAutofit/>
-          </a:bodyPr>
-          <a:lstStyle/>
-          <a:p>
-            <a:pPr marL="0" lvl="0" indent="0" algn="l" rtl="0">
-              <a:spcBef>
-                <a:spcPts val="0"/>
-              </a:spcBef>
-              <a:spcAft>
-                <a:spcPts val="0"/>
-              </a:spcAft>
-              <a:buNone/>
-            </a:pPr>
-            <a:endParaRPr/>
-          </a:p>
-        </p:txBody>
-      </p:sp>
-      <p:sp>
-        <p:nvSpPr>
-          <p:cNvPr id="30" name="Google Shape;241;p36">
-            <a:extLst>
-              <a:ext uri="{FF2B5EF4-FFF2-40B4-BE49-F238E27FC236}">
-                <a16:creationId xmlns:a16="http://schemas.microsoft.com/office/drawing/2014/main" id="{92EBD80F-9C57-E4A2-6B94-4E41CB5CFDCB}"/>
-              </a:ext>
-            </a:extLst>
-          </p:cNvPr>
-          <p:cNvSpPr txBox="1"/>
-          <p:nvPr/>
-        </p:nvSpPr>
-        <p:spPr>
-          <a:xfrm>
-            <a:off x="1964726" y="3097976"/>
-            <a:ext cx="1754701" cy="809400"/>
-          </a:xfrm>
-          <a:prstGeom prst="rect">
-            <a:avLst/>
-          </a:prstGeom>
-          <a:noFill/>
-          <a:ln>
-            <a:noFill/>
-          </a:ln>
-        </p:spPr>
-        <p:txBody>
-          <a:bodyPr spcFirstLastPara="1" wrap="square" lIns="91425" tIns="91425" rIns="91425" bIns="91425" anchor="t" anchorCtr="0">
-            <a:noAutofit/>
-          </a:bodyPr>
-          <a:lstStyle/>
-          <a:p>
-            <a:pPr lvl="0" algn="ctr"/>
-            <a:r>
-              <a:rPr lang="en-US" dirty="0">
-                <a:solidFill>
-                  <a:schemeClr val="dk1"/>
-                </a:solidFill>
-                <a:latin typeface="Lato"/>
-                <a:ea typeface="Lato"/>
-                <a:cs typeface="Lato"/>
-                <a:sym typeface="Lato"/>
-              </a:rPr>
-              <a:t>Time-saving for customers by automating lawn care services</a:t>
-            </a:r>
-          </a:p>
-          <a:p>
-            <a:pPr lvl="0" algn="ctr"/>
-            <a:endParaRPr lang="en-US" dirty="0">
-              <a:solidFill>
-                <a:schemeClr val="dk1"/>
-              </a:solidFill>
-              <a:latin typeface="Lato"/>
-              <a:ea typeface="Lato"/>
-              <a:cs typeface="Lato"/>
-              <a:sym typeface="Lato"/>
-            </a:endParaRPr>
-          </a:p>
-        </p:txBody>
-      </p:sp>
-      <p:cxnSp>
-        <p:nvCxnSpPr>
-          <p:cNvPr id="31" name="Google Shape;244;p36">
-            <a:extLst>
-              <a:ext uri="{FF2B5EF4-FFF2-40B4-BE49-F238E27FC236}">
-                <a16:creationId xmlns:a16="http://schemas.microsoft.com/office/drawing/2014/main" id="{9FF6CE3B-FF68-9397-BA5F-E469214E9403}"/>
-              </a:ext>
-            </a:extLst>
-          </p:cNvPr>
-          <p:cNvCxnSpPr>
-            <a:cxnSpLocks/>
-            <a:stCxn id="29" idx="2"/>
-          </p:cNvCxnSpPr>
-          <p:nvPr/>
-        </p:nvCxnSpPr>
-        <p:spPr>
-          <a:xfrm flipH="1">
-            <a:off x="2842077" y="2419861"/>
-            <a:ext cx="600" cy="544500"/>
-          </a:xfrm>
-          <a:prstGeom prst="straightConnector1">
-            <a:avLst/>
-          </a:prstGeom>
-          <a:noFill/>
-          <a:ln w="19050" cap="flat" cmpd="sng">
-            <a:solidFill>
-              <a:schemeClr val="dk1"/>
-            </a:solidFill>
-            <a:prstDash val="solid"/>
-            <a:round/>
-            <a:headEnd type="none" w="med" len="med"/>
-            <a:tailEnd type="none" w="med" len="med"/>
-          </a:ln>
-        </p:spPr>
-      </p:cxnSp>
-      <p:sp>
-        <p:nvSpPr>
           <p:cNvPr id="16" name="Google Shape;193;p30">
             <a:extLst>
               <a:ext uri="{FF2B5EF4-FFF2-40B4-BE49-F238E27FC236}">
@@ -30553,993 +30562,1032 @@
           </a:p>
         </p:txBody>
       </p:sp>
-      <p:sp>
-        <p:nvSpPr>
-          <p:cNvPr id="19" name="Google Shape;232;p36">
+      <p:grpSp>
+        <p:nvGrpSpPr>
+          <p:cNvPr id="2" name="Group 1">
             <a:extLst>
               <a:ext uri="{FF2B5EF4-FFF2-40B4-BE49-F238E27FC236}">
-                <a16:creationId xmlns:a16="http://schemas.microsoft.com/office/drawing/2014/main" id="{18CDB568-2E15-6737-0C4E-8A85919F087E}"/>
+                <a16:creationId xmlns:a16="http://schemas.microsoft.com/office/drawing/2014/main" id="{013E932C-6ECD-39DB-4859-CBCDB3678641}"/>
               </a:ext>
             </a:extLst>
           </p:cNvPr>
-          <p:cNvSpPr/>
+          <p:cNvGrpSpPr/>
           <p:nvPr/>
-        </p:nvSpPr>
-        <p:spPr>
+        </p:nvGrpSpPr>
+        <p:grpSpPr>
           <a:xfrm>
-            <a:off x="3089615" y="1923167"/>
-            <a:ext cx="498600" cy="498600"/>
+            <a:off x="249905" y="1185656"/>
+            <a:ext cx="8644190" cy="3750317"/>
+            <a:chOff x="178479" y="1102976"/>
+            <a:chExt cx="8644190" cy="3750317"/>
           </a:xfrm>
-          <a:prstGeom prst="ellipse">
-            <a:avLst/>
-          </a:prstGeom>
-          <a:noFill/>
-          <a:ln>
+        </p:grpSpPr>
+        <p:sp>
+          <p:nvSpPr>
+            <p:cNvPr id="29" name="Google Shape;235;p36">
+              <a:extLst>
+                <a:ext uri="{FF2B5EF4-FFF2-40B4-BE49-F238E27FC236}">
+                  <a16:creationId xmlns:a16="http://schemas.microsoft.com/office/drawing/2014/main" id="{F5203E10-1CBD-153A-62CC-DA49A47F9F8A}"/>
+                </a:ext>
+              </a:extLst>
+            </p:cNvPr>
+            <p:cNvSpPr/>
+            <p:nvPr/>
+          </p:nvSpPr>
+          <p:spPr>
+            <a:xfrm>
+              <a:off x="2457149" y="1102976"/>
+              <a:ext cx="766200" cy="762000"/>
+            </a:xfrm>
+            <a:prstGeom prst="roundRect">
+              <a:avLst>
+                <a:gd name="adj" fmla="val 16667"/>
+              </a:avLst>
+            </a:prstGeom>
+            <a:solidFill>
+              <a:schemeClr val="lt2"/>
+            </a:solidFill>
+            <a:ln>
+              <a:noFill/>
+            </a:ln>
+          </p:spPr>
+          <p:txBody>
+            <a:bodyPr spcFirstLastPara="1" wrap="square" lIns="91425" tIns="91425" rIns="91425" bIns="91425" anchor="ctr" anchorCtr="0">
+              <a:noAutofit/>
+            </a:bodyPr>
+            <a:lstStyle/>
+            <a:p>
+              <a:pPr marL="0" lvl="0" indent="0" algn="l" rtl="0">
+                <a:spcBef>
+                  <a:spcPts val="0"/>
+                </a:spcBef>
+                <a:spcAft>
+                  <a:spcPts val="0"/>
+                </a:spcAft>
+                <a:buNone/>
+              </a:pPr>
+              <a:endParaRPr/>
+            </a:p>
+          </p:txBody>
+        </p:sp>
+        <p:sp>
+          <p:nvSpPr>
+            <p:cNvPr id="30" name="Google Shape;241;p36">
+              <a:extLst>
+                <a:ext uri="{FF2B5EF4-FFF2-40B4-BE49-F238E27FC236}">
+                  <a16:creationId xmlns:a16="http://schemas.microsoft.com/office/drawing/2014/main" id="{92EBD80F-9C57-E4A2-6B94-4E41CB5CFDCB}"/>
+                </a:ext>
+              </a:extLst>
+            </p:cNvPr>
+            <p:cNvSpPr txBox="1"/>
+            <p:nvPr/>
+          </p:nvSpPr>
+          <p:spPr>
+            <a:xfrm>
+              <a:off x="1962298" y="2543090"/>
+              <a:ext cx="1754701" cy="1069117"/>
+            </a:xfrm>
+            <a:prstGeom prst="rect">
+              <a:avLst/>
+            </a:prstGeom>
             <a:noFill/>
-          </a:ln>
-        </p:spPr>
-        <p:txBody>
-          <a:bodyPr spcFirstLastPara="1" wrap="square" lIns="91425" tIns="91425" rIns="91425" bIns="91425" anchor="ctr" anchorCtr="0">
-            <a:noAutofit/>
-          </a:bodyPr>
-          <a:lstStyle/>
-          <a:p>
-            <a:pPr marL="0" lvl="0" indent="0" algn="l" rtl="0">
-              <a:spcBef>
-                <a:spcPts val="0"/>
-              </a:spcBef>
-              <a:spcAft>
-                <a:spcPts val="0"/>
-              </a:spcAft>
-              <a:buNone/>
-            </a:pPr>
-            <a:endParaRPr/>
-          </a:p>
-        </p:txBody>
-      </p:sp>
-      <p:sp>
-        <p:nvSpPr>
-          <p:cNvPr id="20" name="Google Shape;233;p36">
-            <a:extLst>
-              <a:ext uri="{FF2B5EF4-FFF2-40B4-BE49-F238E27FC236}">
-                <a16:creationId xmlns:a16="http://schemas.microsoft.com/office/drawing/2014/main" id="{C22DFCD8-C9F5-7D4E-354A-C1A97DB80433}"/>
-              </a:ext>
-            </a:extLst>
-          </p:cNvPr>
-          <p:cNvSpPr/>
-          <p:nvPr/>
-        </p:nvSpPr>
-        <p:spPr>
-          <a:xfrm>
-            <a:off x="7699209" y="1923167"/>
-            <a:ext cx="498600" cy="498600"/>
-          </a:xfrm>
-          <a:prstGeom prst="ellipse">
-            <a:avLst/>
-          </a:prstGeom>
-          <a:noFill/>
-          <a:ln>
+            <a:ln>
+              <a:noFill/>
+            </a:ln>
+          </p:spPr>
+          <p:txBody>
+            <a:bodyPr spcFirstLastPara="1" wrap="square" lIns="91425" tIns="91425" rIns="91425" bIns="91425" anchor="t" anchorCtr="0">
+              <a:noAutofit/>
+            </a:bodyPr>
+            <a:lstStyle/>
+            <a:p>
+              <a:pPr lvl="0" algn="ctr"/>
+              <a:r>
+                <a:rPr lang="en-US" b="1" dirty="0">
+                  <a:solidFill>
+                    <a:schemeClr val="dk1"/>
+                  </a:solidFill>
+                  <a:latin typeface="Lato"/>
+                  <a:ea typeface="Lato"/>
+                  <a:cs typeface="Lato"/>
+                  <a:sym typeface="Lato"/>
+                </a:rPr>
+                <a:t>Time-Saving Automation</a:t>
+              </a:r>
+            </a:p>
+          </p:txBody>
+        </p:sp>
+        <p:cxnSp>
+          <p:nvCxnSpPr>
+            <p:cNvPr id="31" name="Google Shape;244;p36">
+              <a:extLst>
+                <a:ext uri="{FF2B5EF4-FFF2-40B4-BE49-F238E27FC236}">
+                  <a16:creationId xmlns:a16="http://schemas.microsoft.com/office/drawing/2014/main" id="{9FF6CE3B-FF68-9397-BA5F-E469214E9403}"/>
+                </a:ext>
+              </a:extLst>
+            </p:cNvPr>
+            <p:cNvCxnSpPr>
+              <a:cxnSpLocks/>
+              <a:stCxn id="29" idx="2"/>
+            </p:cNvCxnSpPr>
+            <p:nvPr/>
+          </p:nvCxnSpPr>
+          <p:spPr>
+            <a:xfrm flipH="1">
+              <a:off x="2839649" y="1864976"/>
+              <a:ext cx="600" cy="544500"/>
+            </a:xfrm>
+            <a:prstGeom prst="straightConnector1">
+              <a:avLst/>
+            </a:prstGeom>
             <a:noFill/>
-          </a:ln>
-        </p:spPr>
-        <p:txBody>
-          <a:bodyPr spcFirstLastPara="1" wrap="square" lIns="91425" tIns="91425" rIns="91425" bIns="91425" anchor="ctr" anchorCtr="0">
-            <a:noAutofit/>
-          </a:bodyPr>
-          <a:lstStyle/>
-          <a:p>
-            <a:pPr marL="0" lvl="0" indent="0" algn="l" rtl="0">
-              <a:spcBef>
-                <a:spcPts val="0"/>
-              </a:spcBef>
-              <a:spcAft>
-                <a:spcPts val="0"/>
-              </a:spcAft>
-              <a:buNone/>
-            </a:pPr>
-            <a:endParaRPr/>
-          </a:p>
-        </p:txBody>
-      </p:sp>
-      <p:cxnSp>
-        <p:nvCxnSpPr>
-          <p:cNvPr id="25" name="Google Shape;246;p36">
-            <a:extLst>
-              <a:ext uri="{FF2B5EF4-FFF2-40B4-BE49-F238E27FC236}">
-                <a16:creationId xmlns:a16="http://schemas.microsoft.com/office/drawing/2014/main" id="{292F470E-2338-3739-2AAE-2D14CBF0ACED}"/>
-              </a:ext>
-            </a:extLst>
-          </p:cNvPr>
-          <p:cNvCxnSpPr/>
-          <p:nvPr/>
-        </p:nvCxnSpPr>
-        <p:spPr>
-          <a:xfrm>
-            <a:off x="703652" y="2692104"/>
-            <a:ext cx="7709400" cy="0"/>
-          </a:xfrm>
-          <a:prstGeom prst="straightConnector1">
-            <a:avLst/>
-          </a:prstGeom>
-          <a:noFill/>
-          <a:ln w="19050" cap="flat" cmpd="sng">
+            <a:ln w="19050" cap="flat" cmpd="sng">
+              <a:solidFill>
+                <a:schemeClr val="dk1"/>
+              </a:solidFill>
+              <a:prstDash val="solid"/>
+              <a:round/>
+              <a:headEnd type="none" w="med" len="med"/>
+              <a:tailEnd type="none" w="med" len="med"/>
+            </a:ln>
+          </p:spPr>
+        </p:cxnSp>
+        <p:sp>
+          <p:nvSpPr>
+            <p:cNvPr id="19" name="Google Shape;232;p36">
+              <a:extLst>
+                <a:ext uri="{FF2B5EF4-FFF2-40B4-BE49-F238E27FC236}">
+                  <a16:creationId xmlns:a16="http://schemas.microsoft.com/office/drawing/2014/main" id="{18CDB568-2E15-6737-0C4E-8A85919F087E}"/>
+                </a:ext>
+              </a:extLst>
+            </p:cNvPr>
+            <p:cNvSpPr/>
+            <p:nvPr/>
+          </p:nvSpPr>
+          <p:spPr>
+            <a:xfrm>
+              <a:off x="3087187" y="1368282"/>
+              <a:ext cx="498600" cy="498600"/>
+            </a:xfrm>
+            <a:prstGeom prst="ellipse">
+              <a:avLst/>
+            </a:prstGeom>
+            <a:noFill/>
+            <a:ln>
+              <a:noFill/>
+            </a:ln>
+          </p:spPr>
+          <p:txBody>
+            <a:bodyPr spcFirstLastPara="1" wrap="square" lIns="91425" tIns="91425" rIns="91425" bIns="91425" anchor="ctr" anchorCtr="0">
+              <a:noAutofit/>
+            </a:bodyPr>
+            <a:lstStyle/>
+            <a:p>
+              <a:pPr marL="0" lvl="0" indent="0" algn="l" rtl="0">
+                <a:spcBef>
+                  <a:spcPts val="0"/>
+                </a:spcBef>
+                <a:spcAft>
+                  <a:spcPts val="0"/>
+                </a:spcAft>
+                <a:buNone/>
+              </a:pPr>
+              <a:endParaRPr/>
+            </a:p>
+          </p:txBody>
+        </p:sp>
+        <p:sp>
+          <p:nvSpPr>
+            <p:cNvPr id="20" name="Google Shape;233;p36">
+              <a:extLst>
+                <a:ext uri="{FF2B5EF4-FFF2-40B4-BE49-F238E27FC236}">
+                  <a16:creationId xmlns:a16="http://schemas.microsoft.com/office/drawing/2014/main" id="{C22DFCD8-C9F5-7D4E-354A-C1A97DB80433}"/>
+                </a:ext>
+              </a:extLst>
+            </p:cNvPr>
+            <p:cNvSpPr/>
+            <p:nvPr/>
+          </p:nvSpPr>
+          <p:spPr>
+            <a:xfrm>
+              <a:off x="7696781" y="1368282"/>
+              <a:ext cx="498600" cy="498600"/>
+            </a:xfrm>
+            <a:prstGeom prst="ellipse">
+              <a:avLst/>
+            </a:prstGeom>
+            <a:noFill/>
+            <a:ln>
+              <a:noFill/>
+            </a:ln>
+          </p:spPr>
+          <p:txBody>
+            <a:bodyPr spcFirstLastPara="1" wrap="square" lIns="91425" tIns="91425" rIns="91425" bIns="91425" anchor="ctr" anchorCtr="0">
+              <a:noAutofit/>
+            </a:bodyPr>
+            <a:lstStyle/>
+            <a:p>
+              <a:pPr marL="0" lvl="0" indent="0" algn="l" rtl="0">
+                <a:spcBef>
+                  <a:spcPts val="0"/>
+                </a:spcBef>
+                <a:spcAft>
+                  <a:spcPts val="0"/>
+                </a:spcAft>
+                <a:buNone/>
+              </a:pPr>
+              <a:endParaRPr/>
+            </a:p>
+          </p:txBody>
+        </p:sp>
+        <p:cxnSp>
+          <p:nvCxnSpPr>
+            <p:cNvPr id="25" name="Google Shape;246;p36">
+              <a:extLst>
+                <a:ext uri="{FF2B5EF4-FFF2-40B4-BE49-F238E27FC236}">
+                  <a16:creationId xmlns:a16="http://schemas.microsoft.com/office/drawing/2014/main" id="{292F470E-2338-3739-2AAE-2D14CBF0ACED}"/>
+                </a:ext>
+              </a:extLst>
+            </p:cNvPr>
+            <p:cNvCxnSpPr/>
+            <p:nvPr/>
+          </p:nvCxnSpPr>
+          <p:spPr>
+            <a:xfrm>
+              <a:off x="701224" y="2137219"/>
+              <a:ext cx="7709400" cy="0"/>
+            </a:xfrm>
+            <a:prstGeom prst="straightConnector1">
+              <a:avLst/>
+            </a:prstGeom>
+            <a:noFill/>
+            <a:ln w="19050" cap="flat" cmpd="sng">
+              <a:solidFill>
+                <a:schemeClr val="dk1"/>
+              </a:solidFill>
+              <a:prstDash val="solid"/>
+              <a:round/>
+              <a:headEnd type="none" w="med" len="med"/>
+              <a:tailEnd type="none" w="med" len="med"/>
+            </a:ln>
+          </p:spPr>
+        </p:cxnSp>
+        <p:sp>
+          <p:nvSpPr>
+            <p:cNvPr id="23" name="Google Shape;234;p36">
+              <a:extLst>
+                <a:ext uri="{FF2B5EF4-FFF2-40B4-BE49-F238E27FC236}">
+                  <a16:creationId xmlns:a16="http://schemas.microsoft.com/office/drawing/2014/main" id="{A85EAB4A-02CA-D627-E743-024D909A108D}"/>
+                </a:ext>
+              </a:extLst>
+            </p:cNvPr>
+            <p:cNvSpPr/>
+            <p:nvPr/>
+          </p:nvSpPr>
+          <p:spPr>
+            <a:xfrm>
+              <a:off x="716779" y="1102976"/>
+              <a:ext cx="766200" cy="762000"/>
+            </a:xfrm>
+            <a:prstGeom prst="roundRect">
+              <a:avLst>
+                <a:gd name="adj" fmla="val 16667"/>
+              </a:avLst>
+            </a:prstGeom>
             <a:solidFill>
-              <a:schemeClr val="dk1"/>
+              <a:schemeClr val="lt2"/>
             </a:solidFill>
-            <a:prstDash val="solid"/>
-            <a:round/>
-            <a:headEnd type="none" w="med" len="med"/>
-            <a:tailEnd type="none" w="med" len="med"/>
-          </a:ln>
-        </p:spPr>
-      </p:cxnSp>
-      <p:sp>
-        <p:nvSpPr>
-          <p:cNvPr id="23" name="Google Shape;234;p36">
-            <a:extLst>
-              <a:ext uri="{FF2B5EF4-FFF2-40B4-BE49-F238E27FC236}">
-                <a16:creationId xmlns:a16="http://schemas.microsoft.com/office/drawing/2014/main" id="{A85EAB4A-02CA-D627-E743-024D909A108D}"/>
-              </a:ext>
-            </a:extLst>
-          </p:cNvPr>
-          <p:cNvSpPr/>
-          <p:nvPr/>
-        </p:nvSpPr>
-        <p:spPr>
-          <a:xfrm>
-            <a:off x="719207" y="1657861"/>
-            <a:ext cx="766200" cy="762000"/>
-          </a:xfrm>
-          <a:prstGeom prst="roundRect">
-            <a:avLst>
-              <a:gd name="adj" fmla="val 16667"/>
-            </a:avLst>
-          </a:prstGeom>
-          <a:solidFill>
-            <a:schemeClr val="lt2"/>
-          </a:solidFill>
-          <a:ln>
+            <a:ln>
+              <a:noFill/>
+            </a:ln>
+          </p:spPr>
+          <p:txBody>
+            <a:bodyPr spcFirstLastPara="1" wrap="square" lIns="91425" tIns="91425" rIns="91425" bIns="91425" anchor="ctr" anchorCtr="0">
+              <a:noAutofit/>
+            </a:bodyPr>
+            <a:lstStyle/>
+            <a:p>
+              <a:pPr marL="0" lvl="0" indent="0" algn="l" rtl="0">
+                <a:spcBef>
+                  <a:spcPts val="0"/>
+                </a:spcBef>
+                <a:spcAft>
+                  <a:spcPts val="0"/>
+                </a:spcAft>
+                <a:buNone/>
+              </a:pPr>
+              <a:endParaRPr/>
+            </a:p>
+          </p:txBody>
+        </p:sp>
+        <p:sp>
+          <p:nvSpPr>
+            <p:cNvPr id="24" name="Google Shape;239;p36">
+              <a:extLst>
+                <a:ext uri="{FF2B5EF4-FFF2-40B4-BE49-F238E27FC236}">
+                  <a16:creationId xmlns:a16="http://schemas.microsoft.com/office/drawing/2014/main" id="{F7139940-F188-FAE3-5D77-60D6AEEF6F74}"/>
+                </a:ext>
+              </a:extLst>
+            </p:cNvPr>
+            <p:cNvSpPr txBox="1"/>
+            <p:nvPr/>
+          </p:nvSpPr>
+          <p:spPr>
+            <a:xfrm>
+              <a:off x="178479" y="2523521"/>
+              <a:ext cx="1843200" cy="2329772"/>
+            </a:xfrm>
+            <a:prstGeom prst="rect">
+              <a:avLst/>
+            </a:prstGeom>
             <a:noFill/>
-          </a:ln>
-        </p:spPr>
-        <p:txBody>
-          <a:bodyPr spcFirstLastPara="1" wrap="square" lIns="91425" tIns="91425" rIns="91425" bIns="91425" anchor="ctr" anchorCtr="0">
-            <a:noAutofit/>
-          </a:bodyPr>
-          <a:lstStyle/>
-          <a:p>
-            <a:pPr marL="0" lvl="0" indent="0" algn="l" rtl="0">
-              <a:spcBef>
-                <a:spcPts val="0"/>
-              </a:spcBef>
-              <a:spcAft>
-                <a:spcPts val="0"/>
-              </a:spcAft>
-              <a:buNone/>
-            </a:pPr>
-            <a:endParaRPr/>
-          </a:p>
-        </p:txBody>
-      </p:sp>
-      <p:sp>
-        <p:nvSpPr>
-          <p:cNvPr id="24" name="Google Shape;239;p36">
-            <a:extLst>
-              <a:ext uri="{FF2B5EF4-FFF2-40B4-BE49-F238E27FC236}">
-                <a16:creationId xmlns:a16="http://schemas.microsoft.com/office/drawing/2014/main" id="{F7139940-F188-FAE3-5D77-60D6AEEF6F74}"/>
-              </a:ext>
-            </a:extLst>
-          </p:cNvPr>
-          <p:cNvSpPr txBox="1"/>
-          <p:nvPr/>
-        </p:nvSpPr>
-        <p:spPr>
-          <a:xfrm>
-            <a:off x="180907" y="3078407"/>
-            <a:ext cx="1843200" cy="809400"/>
-          </a:xfrm>
-          <a:prstGeom prst="rect">
-            <a:avLst/>
-          </a:prstGeom>
-          <a:noFill/>
-          <a:ln>
+            <a:ln>
+              <a:noFill/>
+            </a:ln>
+          </p:spPr>
+          <p:txBody>
+            <a:bodyPr spcFirstLastPara="1" wrap="square" lIns="91425" tIns="91425" rIns="91425" bIns="91425" anchor="t" anchorCtr="0">
+              <a:noAutofit/>
+            </a:bodyPr>
+            <a:lstStyle/>
+            <a:p>
+              <a:pPr lvl="0" algn="ctr"/>
+              <a:r>
+                <a:rPr lang="en-US" b="1" dirty="0">
+                  <a:solidFill>
+                    <a:schemeClr val="dk1"/>
+                  </a:solidFill>
+                  <a:latin typeface="Lato"/>
+                  <a:ea typeface="Lato"/>
+                  <a:cs typeface="Lato"/>
+                  <a:sym typeface="Lato"/>
+                </a:rPr>
+                <a:t>Convenient and Efficient Scheduling</a:t>
+              </a:r>
+            </a:p>
+          </p:txBody>
+        </p:sp>
+        <p:cxnSp>
+          <p:nvCxnSpPr>
+            <p:cNvPr id="26" name="Google Shape;247;p36">
+              <a:extLst>
+                <a:ext uri="{FF2B5EF4-FFF2-40B4-BE49-F238E27FC236}">
+                  <a16:creationId xmlns:a16="http://schemas.microsoft.com/office/drawing/2014/main" id="{C8773EAB-B808-67D5-77FA-5EE2BF5304CC}"/>
+                </a:ext>
+              </a:extLst>
+            </p:cNvPr>
+            <p:cNvCxnSpPr/>
+            <p:nvPr/>
+          </p:nvCxnSpPr>
+          <p:spPr>
+            <a:xfrm flipH="1">
+              <a:off x="1099767" y="1864951"/>
+              <a:ext cx="600" cy="544500"/>
+            </a:xfrm>
+            <a:prstGeom prst="straightConnector1">
+              <a:avLst/>
+            </a:prstGeom>
             <a:noFill/>
-          </a:ln>
-        </p:spPr>
-        <p:txBody>
-          <a:bodyPr spcFirstLastPara="1" wrap="square" lIns="91425" tIns="91425" rIns="91425" bIns="91425" anchor="t" anchorCtr="0">
-            <a:noAutofit/>
-          </a:bodyPr>
-          <a:lstStyle/>
-          <a:p>
-            <a:pPr lvl="0" algn="ctr"/>
-            <a:r>
-              <a:rPr lang="en-US" dirty="0">
-                <a:solidFill>
-                  <a:schemeClr val="dk1"/>
-                </a:solidFill>
-                <a:latin typeface="Lato"/>
-                <a:ea typeface="Lato"/>
-                <a:cs typeface="Lato"/>
-                <a:sym typeface="Lato"/>
-              </a:rPr>
-              <a:t>Convenient and efficient lawn mowing scheduling using AI technology</a:t>
-            </a:r>
-          </a:p>
-          <a:p>
-            <a:pPr lvl="0" algn="ctr"/>
-            <a:endParaRPr lang="en-US" dirty="0">
+            <a:ln w="19050" cap="flat" cmpd="sng">
               <a:solidFill>
                 <a:schemeClr val="dk1"/>
               </a:solidFill>
-              <a:latin typeface="Lato"/>
-              <a:ea typeface="Lato"/>
-              <a:cs typeface="Lato"/>
-              <a:sym typeface="Lato"/>
-            </a:endParaRPr>
-          </a:p>
-        </p:txBody>
-      </p:sp>
-      <p:cxnSp>
-        <p:nvCxnSpPr>
-          <p:cNvPr id="26" name="Google Shape;247;p36">
-            <a:extLst>
-              <a:ext uri="{FF2B5EF4-FFF2-40B4-BE49-F238E27FC236}">
-                <a16:creationId xmlns:a16="http://schemas.microsoft.com/office/drawing/2014/main" id="{C8773EAB-B808-67D5-77FA-5EE2BF5304CC}"/>
-              </a:ext>
-            </a:extLst>
-          </p:cNvPr>
-          <p:cNvCxnSpPr/>
-          <p:nvPr/>
-        </p:nvCxnSpPr>
-        <p:spPr>
-          <a:xfrm flipH="1">
-            <a:off x="1102195" y="2419836"/>
-            <a:ext cx="600" cy="544500"/>
-          </a:xfrm>
-          <a:prstGeom prst="straightConnector1">
-            <a:avLst/>
-          </a:prstGeom>
-          <a:noFill/>
-          <a:ln w="19050" cap="flat" cmpd="sng">
+              <a:prstDash val="solid"/>
+              <a:round/>
+              <a:headEnd type="none" w="med" len="med"/>
+              <a:tailEnd type="none" w="med" len="med"/>
+            </a:ln>
+          </p:spPr>
+        </p:cxnSp>
+        <p:pic>
+          <p:nvPicPr>
+            <p:cNvPr id="27" name="Picture 26">
+              <a:extLst>
+                <a:ext uri="{FF2B5EF4-FFF2-40B4-BE49-F238E27FC236}">
+                  <a16:creationId xmlns:a16="http://schemas.microsoft.com/office/drawing/2014/main" id="{F4AF8C12-8F15-B343-7FD3-3EFAD199D0B1}"/>
+                </a:ext>
+              </a:extLst>
+            </p:cNvPr>
+            <p:cNvPicPr>
+              <a:picLocks noChangeAspect="1"/>
+            </p:cNvPicPr>
+            <p:nvPr/>
+          </p:nvPicPr>
+          <p:blipFill>
+            <a:blip r:embed="rId3"/>
+            <a:stretch>
+              <a:fillRect/>
+            </a:stretch>
+          </p:blipFill>
+          <p:spPr>
+            <a:xfrm>
+              <a:off x="912427" y="1296524"/>
+              <a:ext cx="374904" cy="374904"/>
+            </a:xfrm>
+            <a:prstGeom prst="rect">
+              <a:avLst/>
+            </a:prstGeom>
+          </p:spPr>
+        </p:pic>
+        <p:sp>
+          <p:nvSpPr>
+            <p:cNvPr id="34" name="Google Shape;236;p36">
+              <a:extLst>
+                <a:ext uri="{FF2B5EF4-FFF2-40B4-BE49-F238E27FC236}">
+                  <a16:creationId xmlns:a16="http://schemas.microsoft.com/office/drawing/2014/main" id="{3955E81B-9858-8576-98BD-890445270CBC}"/>
+                </a:ext>
+              </a:extLst>
+            </p:cNvPr>
+            <p:cNvSpPr/>
+            <p:nvPr/>
+          </p:nvSpPr>
+          <p:spPr>
+            <a:xfrm>
+              <a:off x="7562503" y="1102976"/>
+              <a:ext cx="766200" cy="762000"/>
+            </a:xfrm>
+            <a:prstGeom prst="roundRect">
+              <a:avLst>
+                <a:gd name="adj" fmla="val 16667"/>
+              </a:avLst>
+            </a:prstGeom>
             <a:solidFill>
-              <a:schemeClr val="dk1"/>
+              <a:schemeClr val="lt2"/>
             </a:solidFill>
-            <a:prstDash val="solid"/>
-            <a:round/>
-            <a:headEnd type="none" w="med" len="med"/>
-            <a:tailEnd type="none" w="med" len="med"/>
-          </a:ln>
-        </p:spPr>
-      </p:cxnSp>
-      <p:pic>
-        <p:nvPicPr>
-          <p:cNvPr id="27" name="Picture 26">
-            <a:extLst>
-              <a:ext uri="{FF2B5EF4-FFF2-40B4-BE49-F238E27FC236}">
-                <a16:creationId xmlns:a16="http://schemas.microsoft.com/office/drawing/2014/main" id="{F4AF8C12-8F15-B343-7FD3-3EFAD199D0B1}"/>
-              </a:ext>
-            </a:extLst>
-          </p:cNvPr>
-          <p:cNvPicPr>
-            <a:picLocks noChangeAspect="1"/>
-          </p:cNvPicPr>
-          <p:nvPr/>
-        </p:nvPicPr>
-        <p:blipFill>
-          <a:blip r:embed="rId3"/>
-          <a:stretch>
-            <a:fillRect/>
-          </a:stretch>
-        </p:blipFill>
-        <p:spPr>
-          <a:xfrm>
-            <a:off x="914855" y="1851409"/>
-            <a:ext cx="374904" cy="374904"/>
-          </a:xfrm>
-          <a:prstGeom prst="rect">
-            <a:avLst/>
-          </a:prstGeom>
-        </p:spPr>
-      </p:pic>
-      <p:sp>
-        <p:nvSpPr>
-          <p:cNvPr id="34" name="Google Shape;236;p36">
-            <a:extLst>
-              <a:ext uri="{FF2B5EF4-FFF2-40B4-BE49-F238E27FC236}">
-                <a16:creationId xmlns:a16="http://schemas.microsoft.com/office/drawing/2014/main" id="{3955E81B-9858-8576-98BD-890445270CBC}"/>
-              </a:ext>
-            </a:extLst>
-          </p:cNvPr>
-          <p:cNvSpPr/>
-          <p:nvPr/>
-        </p:nvSpPr>
-        <p:spPr>
-          <a:xfrm>
-            <a:off x="7564931" y="1657861"/>
-            <a:ext cx="766200" cy="762000"/>
-          </a:xfrm>
-          <a:prstGeom prst="roundRect">
-            <a:avLst>
-              <a:gd name="adj" fmla="val 16667"/>
-            </a:avLst>
-          </a:prstGeom>
-          <a:solidFill>
-            <a:schemeClr val="lt2"/>
-          </a:solidFill>
-          <a:ln>
+            <a:ln>
+              <a:noFill/>
+            </a:ln>
+          </p:spPr>
+          <p:txBody>
+            <a:bodyPr spcFirstLastPara="1" wrap="square" lIns="91425" tIns="91425" rIns="91425" bIns="91425" anchor="ctr" anchorCtr="0">
+              <a:noAutofit/>
+            </a:bodyPr>
+            <a:lstStyle/>
+            <a:p>
+              <a:pPr marL="0" lvl="0" indent="0" algn="l" rtl="0">
+                <a:spcBef>
+                  <a:spcPts val="0"/>
+                </a:spcBef>
+                <a:spcAft>
+                  <a:spcPts val="0"/>
+                </a:spcAft>
+                <a:buNone/>
+              </a:pPr>
+              <a:endParaRPr/>
+            </a:p>
+          </p:txBody>
+        </p:sp>
+        <p:sp>
+          <p:nvSpPr>
+            <p:cNvPr id="35" name="Google Shape;243;p36">
+              <a:extLst>
+                <a:ext uri="{FF2B5EF4-FFF2-40B4-BE49-F238E27FC236}">
+                  <a16:creationId xmlns:a16="http://schemas.microsoft.com/office/drawing/2014/main" id="{E9F8E619-3DF0-DABB-289E-0210AA0F34C8}"/>
+                </a:ext>
+              </a:extLst>
+            </p:cNvPr>
+            <p:cNvSpPr txBox="1"/>
+            <p:nvPr/>
+          </p:nvSpPr>
+          <p:spPr>
+            <a:xfrm>
+              <a:off x="7068869" y="2523527"/>
+              <a:ext cx="1753800" cy="2171555"/>
+            </a:xfrm>
+            <a:prstGeom prst="rect">
+              <a:avLst/>
+            </a:prstGeom>
             <a:noFill/>
-          </a:ln>
-        </p:spPr>
-        <p:txBody>
-          <a:bodyPr spcFirstLastPara="1" wrap="square" lIns="91425" tIns="91425" rIns="91425" bIns="91425" anchor="ctr" anchorCtr="0">
-            <a:noAutofit/>
-          </a:bodyPr>
-          <a:lstStyle/>
-          <a:p>
-            <a:pPr marL="0" lvl="0" indent="0" algn="l" rtl="0">
-              <a:spcBef>
-                <a:spcPts val="0"/>
-              </a:spcBef>
-              <a:spcAft>
-                <a:spcPts val="0"/>
-              </a:spcAft>
-              <a:buNone/>
-            </a:pPr>
-            <a:endParaRPr/>
-          </a:p>
-        </p:txBody>
-      </p:sp>
-      <p:sp>
-        <p:nvSpPr>
-          <p:cNvPr id="35" name="Google Shape;243;p36">
-            <a:extLst>
-              <a:ext uri="{FF2B5EF4-FFF2-40B4-BE49-F238E27FC236}">
-                <a16:creationId xmlns:a16="http://schemas.microsoft.com/office/drawing/2014/main" id="{E9F8E619-3DF0-DABB-289E-0210AA0F34C8}"/>
-              </a:ext>
-            </a:extLst>
-          </p:cNvPr>
-          <p:cNvSpPr txBox="1"/>
-          <p:nvPr/>
-        </p:nvSpPr>
-        <p:spPr>
-          <a:xfrm>
-            <a:off x="7071297" y="3078413"/>
-            <a:ext cx="1753800" cy="1506522"/>
-          </a:xfrm>
-          <a:prstGeom prst="rect">
-            <a:avLst/>
-          </a:prstGeom>
-          <a:noFill/>
-          <a:ln>
+            <a:ln>
+              <a:noFill/>
+            </a:ln>
+          </p:spPr>
+          <p:txBody>
+            <a:bodyPr spcFirstLastPara="1" wrap="square" lIns="91425" tIns="91425" rIns="91425" bIns="91425" anchor="t" anchorCtr="0">
+              <a:noAutofit/>
+            </a:bodyPr>
+            <a:lstStyle/>
+            <a:p>
+              <a:pPr lvl="0" algn="ctr"/>
+              <a:r>
+                <a:rPr lang="en-US" b="1" dirty="0">
+                  <a:solidFill>
+                    <a:schemeClr val="dk1"/>
+                  </a:solidFill>
+                  <a:latin typeface="Lato"/>
+                  <a:ea typeface="Lato"/>
+                  <a:cs typeface="Lato"/>
+                  <a:sym typeface="Lato"/>
+                </a:rPr>
+                <a:t>Real-Time Updates and Engagement</a:t>
+              </a:r>
+            </a:p>
+          </p:txBody>
+        </p:sp>
+        <p:cxnSp>
+          <p:nvCxnSpPr>
+            <p:cNvPr id="36" name="Google Shape;245;p36">
+              <a:extLst>
+                <a:ext uri="{FF2B5EF4-FFF2-40B4-BE49-F238E27FC236}">
+                  <a16:creationId xmlns:a16="http://schemas.microsoft.com/office/drawing/2014/main" id="{736A6800-591A-788C-5632-F73FEE0EED3F}"/>
+                </a:ext>
+              </a:extLst>
+            </p:cNvPr>
+            <p:cNvCxnSpPr>
+              <a:cxnSpLocks/>
+              <a:stCxn id="34" idx="2"/>
+            </p:cNvCxnSpPr>
+            <p:nvPr/>
+          </p:nvCxnSpPr>
+          <p:spPr>
+            <a:xfrm>
+              <a:off x="7945603" y="1864976"/>
+              <a:ext cx="600" cy="544500"/>
+            </a:xfrm>
+            <a:prstGeom prst="straightConnector1">
+              <a:avLst/>
+            </a:prstGeom>
             <a:noFill/>
-          </a:ln>
-        </p:spPr>
-        <p:txBody>
-          <a:bodyPr spcFirstLastPara="1" wrap="square" lIns="91425" tIns="91425" rIns="91425" bIns="91425" anchor="t" anchorCtr="0">
-            <a:noAutofit/>
-          </a:bodyPr>
-          <a:lstStyle/>
-          <a:p>
-            <a:pPr lvl="0" algn="ctr"/>
-            <a:r>
-              <a:rPr lang="en-US" dirty="0">
-                <a:solidFill>
-                  <a:schemeClr val="dk1"/>
-                </a:solidFill>
-                <a:latin typeface="Lato"/>
-                <a:ea typeface="Lato"/>
-                <a:cs typeface="Lato"/>
-                <a:sym typeface="Lato"/>
-              </a:rPr>
-              <a:t>Real-time updates and notifications for customers</a:t>
-            </a:r>
-          </a:p>
-          <a:p>
-            <a:pPr lvl="0" algn="ctr"/>
-            <a:endParaRPr lang="en-US" dirty="0">
+            <a:ln w="19050" cap="flat" cmpd="sng">
               <a:solidFill>
                 <a:schemeClr val="dk1"/>
               </a:solidFill>
-              <a:latin typeface="Lato"/>
-              <a:ea typeface="Lato"/>
-              <a:cs typeface="Lato"/>
-              <a:sym typeface="Lato"/>
-            </a:endParaRPr>
-          </a:p>
-        </p:txBody>
-      </p:sp>
-      <p:cxnSp>
-        <p:nvCxnSpPr>
-          <p:cNvPr id="36" name="Google Shape;245;p36">
-            <a:extLst>
-              <a:ext uri="{FF2B5EF4-FFF2-40B4-BE49-F238E27FC236}">
-                <a16:creationId xmlns:a16="http://schemas.microsoft.com/office/drawing/2014/main" id="{736A6800-591A-788C-5632-F73FEE0EED3F}"/>
-              </a:ext>
-            </a:extLst>
-          </p:cNvPr>
-          <p:cNvCxnSpPr>
-            <a:cxnSpLocks/>
-            <a:stCxn id="34" idx="2"/>
-          </p:cNvCxnSpPr>
-          <p:nvPr/>
-        </p:nvCxnSpPr>
-        <p:spPr>
-          <a:xfrm>
-            <a:off x="7948031" y="2419861"/>
-            <a:ext cx="600" cy="544500"/>
-          </a:xfrm>
-          <a:prstGeom prst="straightConnector1">
-            <a:avLst/>
-          </a:prstGeom>
-          <a:noFill/>
-          <a:ln w="19050" cap="flat" cmpd="sng">
+              <a:prstDash val="solid"/>
+              <a:round/>
+              <a:headEnd type="none" w="med" len="med"/>
+              <a:tailEnd type="none" w="med" len="med"/>
+            </a:ln>
+          </p:spPr>
+        </p:cxnSp>
+        <p:sp>
+          <p:nvSpPr>
+            <p:cNvPr id="39" name="Google Shape;232;p36">
+              <a:extLst>
+                <a:ext uri="{FF2B5EF4-FFF2-40B4-BE49-F238E27FC236}">
+                  <a16:creationId xmlns:a16="http://schemas.microsoft.com/office/drawing/2014/main" id="{5FF7E2FB-625D-6EC5-BA31-950ADBE829EA}"/>
+                </a:ext>
+              </a:extLst>
+            </p:cNvPr>
+            <p:cNvSpPr/>
+            <p:nvPr/>
+          </p:nvSpPr>
+          <p:spPr>
+            <a:xfrm>
+              <a:off x="4544180" y="1368282"/>
+              <a:ext cx="498600" cy="498600"/>
+            </a:xfrm>
+            <a:prstGeom prst="ellipse">
+              <a:avLst/>
+            </a:prstGeom>
+            <a:noFill/>
+            <a:ln>
+              <a:noFill/>
+            </a:ln>
+          </p:spPr>
+          <p:txBody>
+            <a:bodyPr spcFirstLastPara="1" wrap="square" lIns="91425" tIns="91425" rIns="91425" bIns="91425" anchor="ctr" anchorCtr="0">
+              <a:noAutofit/>
+            </a:bodyPr>
+            <a:lstStyle/>
+            <a:p>
+              <a:pPr marL="0" lvl="0" indent="0" algn="l" rtl="0">
+                <a:spcBef>
+                  <a:spcPts val="0"/>
+                </a:spcBef>
+                <a:spcAft>
+                  <a:spcPts val="0"/>
+                </a:spcAft>
+                <a:buNone/>
+              </a:pPr>
+              <a:endParaRPr/>
+            </a:p>
+          </p:txBody>
+        </p:sp>
+        <p:sp>
+          <p:nvSpPr>
+            <p:cNvPr id="59" name="Google Shape;235;p36">
+              <a:extLst>
+                <a:ext uri="{FF2B5EF4-FFF2-40B4-BE49-F238E27FC236}">
+                  <a16:creationId xmlns:a16="http://schemas.microsoft.com/office/drawing/2014/main" id="{9F621B7C-CAE3-D00F-C4CE-7999F35D6CBD}"/>
+                </a:ext>
+              </a:extLst>
+            </p:cNvPr>
+            <p:cNvSpPr/>
+            <p:nvPr/>
+          </p:nvSpPr>
+          <p:spPr>
+            <a:xfrm>
+              <a:off x="4177192" y="1102976"/>
+              <a:ext cx="766200" cy="762000"/>
+            </a:xfrm>
+            <a:prstGeom prst="roundRect">
+              <a:avLst>
+                <a:gd name="adj" fmla="val 16667"/>
+              </a:avLst>
+            </a:prstGeom>
             <a:solidFill>
-              <a:schemeClr val="dk1"/>
+              <a:schemeClr val="lt2"/>
             </a:solidFill>
-            <a:prstDash val="solid"/>
-            <a:round/>
-            <a:headEnd type="none" w="med" len="med"/>
-            <a:tailEnd type="none" w="med" len="med"/>
-          </a:ln>
-        </p:spPr>
-      </p:cxnSp>
-      <p:sp>
-        <p:nvSpPr>
-          <p:cNvPr id="38" name="Google Shape;248;p36">
-            <a:extLst>
-              <a:ext uri="{FF2B5EF4-FFF2-40B4-BE49-F238E27FC236}">
-                <a16:creationId xmlns:a16="http://schemas.microsoft.com/office/drawing/2014/main" id="{C640840E-7BAA-2319-F34D-537BC91A7765}"/>
-              </a:ext>
-            </a:extLst>
-          </p:cNvPr>
-          <p:cNvSpPr txBox="1"/>
-          <p:nvPr/>
-        </p:nvSpPr>
-        <p:spPr>
-          <a:xfrm>
-            <a:off x="3650400" y="4446894"/>
-            <a:ext cx="1843200" cy="415200"/>
-          </a:xfrm>
-          <a:prstGeom prst="rect">
-            <a:avLst/>
-          </a:prstGeom>
-          <a:noFill/>
-          <a:ln>
+            <a:ln>
+              <a:noFill/>
+            </a:ln>
+          </p:spPr>
+          <p:txBody>
+            <a:bodyPr spcFirstLastPara="1" wrap="square" lIns="91425" tIns="91425" rIns="91425" bIns="91425" anchor="ctr" anchorCtr="0">
+              <a:noAutofit/>
+            </a:bodyPr>
+            <a:lstStyle/>
+            <a:p>
+              <a:pPr marL="0" lvl="0" indent="0" algn="l" rtl="0">
+                <a:spcBef>
+                  <a:spcPts val="0"/>
+                </a:spcBef>
+                <a:spcAft>
+                  <a:spcPts val="0"/>
+                </a:spcAft>
+                <a:buNone/>
+              </a:pPr>
+              <a:endParaRPr/>
+            </a:p>
+          </p:txBody>
+        </p:sp>
+        <p:sp>
+          <p:nvSpPr>
+            <p:cNvPr id="60" name="Google Shape;241;p36">
+              <a:extLst>
+                <a:ext uri="{FF2B5EF4-FFF2-40B4-BE49-F238E27FC236}">
+                  <a16:creationId xmlns:a16="http://schemas.microsoft.com/office/drawing/2014/main" id="{1B5FF4FB-6DCC-F3FF-F3D7-71EAE2DE6793}"/>
+                </a:ext>
+              </a:extLst>
+            </p:cNvPr>
+            <p:cNvSpPr txBox="1"/>
+            <p:nvPr/>
+          </p:nvSpPr>
+          <p:spPr>
+            <a:xfrm>
+              <a:off x="3684028" y="2534147"/>
+              <a:ext cx="1754701" cy="1184023"/>
+            </a:xfrm>
+            <a:prstGeom prst="rect">
+              <a:avLst/>
+            </a:prstGeom>
             <a:noFill/>
-          </a:ln>
-        </p:spPr>
-        <p:txBody>
-          <a:bodyPr spcFirstLastPara="1" wrap="square" lIns="91425" tIns="91425" rIns="91425" bIns="91425" anchor="t" anchorCtr="0">
-            <a:noAutofit/>
-          </a:bodyPr>
-          <a:lstStyle/>
-          <a:p>
-            <a:pPr marL="0" lvl="0" indent="0" algn="ctr" rtl="0">
-              <a:spcBef>
-                <a:spcPts val="0"/>
-              </a:spcBef>
-              <a:spcAft>
-                <a:spcPts val="0"/>
-              </a:spcAft>
-              <a:buNone/>
-            </a:pPr>
-            <a:r>
-              <a:rPr lang="en-US" dirty="0">
-                <a:solidFill>
-                  <a:schemeClr val="dk1"/>
-                </a:solidFill>
-                <a:latin typeface="Lato"/>
-                <a:ea typeface="Lato"/>
-                <a:cs typeface="Lato"/>
-                <a:sym typeface="Lato"/>
-              </a:rPr>
-              <a:t>Lawn Buddy</a:t>
-            </a:r>
-            <a:endParaRPr dirty="0">
+            <a:ln>
+              <a:noFill/>
+            </a:ln>
+          </p:spPr>
+          <p:txBody>
+            <a:bodyPr spcFirstLastPara="1" wrap="square" lIns="91425" tIns="91425" rIns="91425" bIns="91425" anchor="t" anchorCtr="0">
+              <a:noAutofit/>
+            </a:bodyPr>
+            <a:lstStyle/>
+            <a:p>
+              <a:pPr lvl="0" algn="ctr"/>
+              <a:r>
+                <a:rPr lang="en-US" b="1" dirty="0">
+                  <a:solidFill>
+                    <a:schemeClr val="dk1"/>
+                  </a:solidFill>
+                  <a:latin typeface="Lato"/>
+                  <a:ea typeface="Lato"/>
+                  <a:cs typeface="Lato"/>
+                  <a:sym typeface="Lato"/>
+                </a:rPr>
+                <a:t>Tailored Personalization</a:t>
+              </a:r>
+            </a:p>
+          </p:txBody>
+        </p:sp>
+        <p:cxnSp>
+          <p:nvCxnSpPr>
+            <p:cNvPr id="61" name="Google Shape;244;p36">
+              <a:extLst>
+                <a:ext uri="{FF2B5EF4-FFF2-40B4-BE49-F238E27FC236}">
+                  <a16:creationId xmlns:a16="http://schemas.microsoft.com/office/drawing/2014/main" id="{912F1050-5AD3-B524-F72D-4662AEFB4D89}"/>
+                </a:ext>
+              </a:extLst>
+            </p:cNvPr>
+            <p:cNvCxnSpPr>
+              <a:cxnSpLocks/>
+              <a:stCxn id="59" idx="2"/>
+            </p:cNvCxnSpPr>
+            <p:nvPr/>
+          </p:nvCxnSpPr>
+          <p:spPr>
+            <a:xfrm flipH="1">
+              <a:off x="4559692" y="1864976"/>
+              <a:ext cx="600" cy="544500"/>
+            </a:xfrm>
+            <a:prstGeom prst="straightConnector1">
+              <a:avLst/>
+            </a:prstGeom>
+            <a:noFill/>
+            <a:ln w="19050" cap="flat" cmpd="sng">
               <a:solidFill>
                 <a:schemeClr val="dk1"/>
               </a:solidFill>
-              <a:latin typeface="Lato"/>
-              <a:ea typeface="Lato"/>
-              <a:cs typeface="Lato"/>
-              <a:sym typeface="Lato"/>
-            </a:endParaRPr>
-          </a:p>
-        </p:txBody>
-      </p:sp>
-      <p:sp>
-        <p:nvSpPr>
-          <p:cNvPr id="39" name="Google Shape;232;p36">
-            <a:extLst>
-              <a:ext uri="{FF2B5EF4-FFF2-40B4-BE49-F238E27FC236}">
-                <a16:creationId xmlns:a16="http://schemas.microsoft.com/office/drawing/2014/main" id="{5FF7E2FB-625D-6EC5-BA31-950ADBE829EA}"/>
-              </a:ext>
-            </a:extLst>
-          </p:cNvPr>
-          <p:cNvSpPr/>
-          <p:nvPr/>
-        </p:nvSpPr>
-        <p:spPr>
-          <a:xfrm>
-            <a:off x="4546608" y="1923167"/>
-            <a:ext cx="498600" cy="498600"/>
-          </a:xfrm>
-          <a:prstGeom prst="ellipse">
-            <a:avLst/>
-          </a:prstGeom>
-          <a:noFill/>
-          <a:ln>
+              <a:prstDash val="solid"/>
+              <a:round/>
+              <a:headEnd type="none" w="med" len="med"/>
+              <a:tailEnd type="none" w="med" len="med"/>
+            </a:ln>
+          </p:spPr>
+        </p:cxnSp>
+        <p:sp>
+          <p:nvSpPr>
+            <p:cNvPr id="63" name="Google Shape;232;p36">
+              <a:extLst>
+                <a:ext uri="{FF2B5EF4-FFF2-40B4-BE49-F238E27FC236}">
+                  <a16:creationId xmlns:a16="http://schemas.microsoft.com/office/drawing/2014/main" id="{0502E4E7-6931-DA6C-2458-255E1AAD81FC}"/>
+                </a:ext>
+              </a:extLst>
+            </p:cNvPr>
+            <p:cNvSpPr/>
+            <p:nvPr/>
+          </p:nvSpPr>
+          <p:spPr>
+            <a:xfrm>
+              <a:off x="5833376" y="1368282"/>
+              <a:ext cx="498600" cy="498600"/>
+            </a:xfrm>
+            <a:prstGeom prst="ellipse">
+              <a:avLst/>
+            </a:prstGeom>
             <a:noFill/>
-          </a:ln>
-        </p:spPr>
-        <p:txBody>
-          <a:bodyPr spcFirstLastPara="1" wrap="square" lIns="91425" tIns="91425" rIns="91425" bIns="91425" anchor="ctr" anchorCtr="0">
-            <a:noAutofit/>
-          </a:bodyPr>
-          <a:lstStyle/>
-          <a:p>
-            <a:pPr marL="0" lvl="0" indent="0" algn="l" rtl="0">
-              <a:spcBef>
-                <a:spcPts val="0"/>
-              </a:spcBef>
-              <a:spcAft>
-                <a:spcPts val="0"/>
-              </a:spcAft>
-              <a:buNone/>
-            </a:pPr>
-            <a:endParaRPr/>
-          </a:p>
-        </p:txBody>
-      </p:sp>
-      <p:sp>
-        <p:nvSpPr>
-          <p:cNvPr id="59" name="Google Shape;235;p36">
-            <a:extLst>
-              <a:ext uri="{FF2B5EF4-FFF2-40B4-BE49-F238E27FC236}">
-                <a16:creationId xmlns:a16="http://schemas.microsoft.com/office/drawing/2014/main" id="{9F621B7C-CAE3-D00F-C4CE-7999F35D6CBD}"/>
-              </a:ext>
-            </a:extLst>
-          </p:cNvPr>
-          <p:cNvSpPr/>
-          <p:nvPr/>
-        </p:nvSpPr>
-        <p:spPr>
-          <a:xfrm>
-            <a:off x="4179620" y="1657861"/>
-            <a:ext cx="766200" cy="762000"/>
-          </a:xfrm>
-          <a:prstGeom prst="roundRect">
-            <a:avLst>
-              <a:gd name="adj" fmla="val 16667"/>
-            </a:avLst>
-          </a:prstGeom>
-          <a:solidFill>
-            <a:schemeClr val="lt2"/>
-          </a:solidFill>
-          <a:ln>
+            <a:ln>
+              <a:noFill/>
+            </a:ln>
+          </p:spPr>
+          <p:txBody>
+            <a:bodyPr spcFirstLastPara="1" wrap="square" lIns="91425" tIns="91425" rIns="91425" bIns="91425" anchor="ctr" anchorCtr="0">
+              <a:noAutofit/>
+            </a:bodyPr>
+            <a:lstStyle/>
+            <a:p>
+              <a:pPr marL="0" lvl="0" indent="0" algn="l" rtl="0">
+                <a:spcBef>
+                  <a:spcPts val="0"/>
+                </a:spcBef>
+                <a:spcAft>
+                  <a:spcPts val="0"/>
+                </a:spcAft>
+                <a:buNone/>
+              </a:pPr>
+              <a:endParaRPr/>
+            </a:p>
+          </p:txBody>
+        </p:sp>
+        <p:sp>
+          <p:nvSpPr>
+            <p:cNvPr id="129" name="Google Shape;235;p36">
+              <a:extLst>
+                <a:ext uri="{FF2B5EF4-FFF2-40B4-BE49-F238E27FC236}">
+                  <a16:creationId xmlns:a16="http://schemas.microsoft.com/office/drawing/2014/main" id="{7924555E-D160-8FDA-A5ED-3CC443E00C59}"/>
+                </a:ext>
+              </a:extLst>
+            </p:cNvPr>
+            <p:cNvSpPr/>
+            <p:nvPr/>
+          </p:nvSpPr>
+          <p:spPr>
+            <a:xfrm>
+              <a:off x="5910626" y="1121124"/>
+              <a:ext cx="766200" cy="762000"/>
+            </a:xfrm>
+            <a:prstGeom prst="roundRect">
+              <a:avLst>
+                <a:gd name="adj" fmla="val 16667"/>
+              </a:avLst>
+            </a:prstGeom>
+            <a:solidFill>
+              <a:schemeClr val="lt2"/>
+            </a:solidFill>
+            <a:ln>
+              <a:noFill/>
+            </a:ln>
+          </p:spPr>
+          <p:txBody>
+            <a:bodyPr spcFirstLastPara="1" wrap="square" lIns="91425" tIns="91425" rIns="91425" bIns="91425" anchor="ctr" anchorCtr="0">
+              <a:noAutofit/>
+            </a:bodyPr>
+            <a:lstStyle/>
+            <a:p>
+              <a:pPr marL="0" lvl="0" indent="0" algn="l" rtl="0">
+                <a:spcBef>
+                  <a:spcPts val="0"/>
+                </a:spcBef>
+                <a:spcAft>
+                  <a:spcPts val="0"/>
+                </a:spcAft>
+                <a:buNone/>
+              </a:pPr>
+              <a:endParaRPr/>
+            </a:p>
+          </p:txBody>
+        </p:sp>
+        <p:sp>
+          <p:nvSpPr>
+            <p:cNvPr id="130" name="Google Shape;241;p36">
+              <a:extLst>
+                <a:ext uri="{FF2B5EF4-FFF2-40B4-BE49-F238E27FC236}">
+                  <a16:creationId xmlns:a16="http://schemas.microsoft.com/office/drawing/2014/main" id="{E6AB7BE9-B809-CA49-1F5D-AF0D173E9046}"/>
+                </a:ext>
+              </a:extLst>
+            </p:cNvPr>
+            <p:cNvSpPr txBox="1"/>
+            <p:nvPr/>
+          </p:nvSpPr>
+          <p:spPr>
+            <a:xfrm>
+              <a:off x="5404588" y="2541676"/>
+              <a:ext cx="1777076" cy="1176494"/>
+            </a:xfrm>
+            <a:prstGeom prst="rect">
+              <a:avLst/>
+            </a:prstGeom>
             <a:noFill/>
-          </a:ln>
-        </p:spPr>
-        <p:txBody>
-          <a:bodyPr spcFirstLastPara="1" wrap="square" lIns="91425" tIns="91425" rIns="91425" bIns="91425" anchor="ctr" anchorCtr="0">
-            <a:noAutofit/>
-          </a:bodyPr>
-          <a:lstStyle/>
-          <a:p>
-            <a:pPr marL="0" lvl="0" indent="0" algn="l" rtl="0">
-              <a:spcBef>
-                <a:spcPts val="0"/>
-              </a:spcBef>
-              <a:spcAft>
-                <a:spcPts val="0"/>
-              </a:spcAft>
-              <a:buNone/>
-            </a:pPr>
-            <a:endParaRPr/>
-          </a:p>
-        </p:txBody>
-      </p:sp>
-      <p:sp>
-        <p:nvSpPr>
-          <p:cNvPr id="60" name="Google Shape;241;p36">
-            <a:extLst>
-              <a:ext uri="{FF2B5EF4-FFF2-40B4-BE49-F238E27FC236}">
-                <a16:creationId xmlns:a16="http://schemas.microsoft.com/office/drawing/2014/main" id="{1B5FF4FB-6DCC-F3FF-F3D7-71EAE2DE6793}"/>
-              </a:ext>
-            </a:extLst>
-          </p:cNvPr>
-          <p:cNvSpPr txBox="1"/>
-          <p:nvPr/>
-        </p:nvSpPr>
-        <p:spPr>
-          <a:xfrm>
-            <a:off x="3686456" y="3089033"/>
-            <a:ext cx="1754701" cy="809400"/>
-          </a:xfrm>
-          <a:prstGeom prst="rect">
-            <a:avLst/>
-          </a:prstGeom>
-          <a:noFill/>
-          <a:ln>
+            <a:ln>
+              <a:noFill/>
+            </a:ln>
+          </p:spPr>
+          <p:txBody>
+            <a:bodyPr spcFirstLastPara="1" wrap="square" lIns="91425" tIns="91425" rIns="91425" bIns="91425" anchor="t" anchorCtr="0">
+              <a:noAutofit/>
+            </a:bodyPr>
+            <a:lstStyle/>
+            <a:p>
+              <a:pPr lvl="0" algn="ctr"/>
+              <a:r>
+                <a:rPr lang="en-US" b="1" dirty="0">
+                  <a:solidFill>
+                    <a:schemeClr val="dk1"/>
+                  </a:solidFill>
+                  <a:latin typeface="Lato"/>
+                  <a:ea typeface="Lato"/>
+                  <a:cs typeface="Lato"/>
+                  <a:sym typeface="Lato"/>
+                </a:rPr>
+                <a:t>Reliable Skilled Professionals</a:t>
+              </a:r>
+            </a:p>
+          </p:txBody>
+        </p:sp>
+        <p:cxnSp>
+          <p:nvCxnSpPr>
+            <p:cNvPr id="131" name="Google Shape;244;p36">
+              <a:extLst>
+                <a:ext uri="{FF2B5EF4-FFF2-40B4-BE49-F238E27FC236}">
+                  <a16:creationId xmlns:a16="http://schemas.microsoft.com/office/drawing/2014/main" id="{994F0642-67D7-A4A4-504C-B6EEFB426774}"/>
+                </a:ext>
+              </a:extLst>
+            </p:cNvPr>
+            <p:cNvCxnSpPr>
+              <a:cxnSpLocks/>
+              <a:stCxn id="129" idx="2"/>
+            </p:cNvCxnSpPr>
+            <p:nvPr/>
+          </p:nvCxnSpPr>
+          <p:spPr>
+            <a:xfrm flipH="1">
+              <a:off x="6293126" y="1883124"/>
+              <a:ext cx="600" cy="544500"/>
+            </a:xfrm>
+            <a:prstGeom prst="straightConnector1">
+              <a:avLst/>
+            </a:prstGeom>
             <a:noFill/>
-          </a:ln>
-        </p:spPr>
-        <p:txBody>
-          <a:bodyPr spcFirstLastPara="1" wrap="square" lIns="91425" tIns="91425" rIns="91425" bIns="91425" anchor="t" anchorCtr="0">
-            <a:noAutofit/>
-          </a:bodyPr>
-          <a:lstStyle/>
-          <a:p>
-            <a:pPr lvl="0" algn="ctr"/>
-            <a:r>
-              <a:rPr lang="en-US" dirty="0">
-                <a:solidFill>
-                  <a:schemeClr val="dk1"/>
-                </a:solidFill>
-                <a:latin typeface="Lato"/>
-                <a:ea typeface="Lato"/>
-                <a:cs typeface="Lato"/>
-                <a:sym typeface="Lato"/>
-              </a:rPr>
-              <a:t>Personalized lawn care plans based on lawn size, location, and specific needs</a:t>
-            </a:r>
-          </a:p>
-          <a:p>
-            <a:pPr lvl="0" algn="ctr"/>
-            <a:endParaRPr lang="en-US" dirty="0">
+            <a:ln w="19050" cap="flat" cmpd="sng">
               <a:solidFill>
                 <a:schemeClr val="dk1"/>
               </a:solidFill>
-              <a:latin typeface="Lato"/>
-              <a:ea typeface="Lato"/>
-              <a:cs typeface="Lato"/>
-              <a:sym typeface="Lato"/>
-            </a:endParaRPr>
-          </a:p>
-        </p:txBody>
-      </p:sp>
-      <p:cxnSp>
-        <p:nvCxnSpPr>
-          <p:cNvPr id="61" name="Google Shape;244;p36">
-            <a:extLst>
-              <a:ext uri="{FF2B5EF4-FFF2-40B4-BE49-F238E27FC236}">
-                <a16:creationId xmlns:a16="http://schemas.microsoft.com/office/drawing/2014/main" id="{912F1050-5AD3-B524-F72D-4662AEFB4D89}"/>
-              </a:ext>
-            </a:extLst>
-          </p:cNvPr>
-          <p:cNvCxnSpPr>
-            <a:cxnSpLocks/>
-            <a:stCxn id="59" idx="2"/>
-          </p:cNvCxnSpPr>
-          <p:nvPr/>
-        </p:nvCxnSpPr>
-        <p:spPr>
-          <a:xfrm flipH="1">
-            <a:off x="4562120" y="2419861"/>
-            <a:ext cx="600" cy="544500"/>
-          </a:xfrm>
-          <a:prstGeom prst="straightConnector1">
-            <a:avLst/>
-          </a:prstGeom>
-          <a:noFill/>
-          <a:ln w="19050" cap="flat" cmpd="sng">
-            <a:solidFill>
-              <a:schemeClr val="dk1"/>
-            </a:solidFill>
-            <a:prstDash val="solid"/>
-            <a:round/>
-            <a:headEnd type="none" w="med" len="med"/>
-            <a:tailEnd type="none" w="med" len="med"/>
-          </a:ln>
-        </p:spPr>
-      </p:cxnSp>
-      <p:sp>
-        <p:nvSpPr>
-          <p:cNvPr id="63" name="Google Shape;232;p36">
-            <a:extLst>
-              <a:ext uri="{FF2B5EF4-FFF2-40B4-BE49-F238E27FC236}">
-                <a16:creationId xmlns:a16="http://schemas.microsoft.com/office/drawing/2014/main" id="{0502E4E7-6931-DA6C-2458-255E1AAD81FC}"/>
-              </a:ext>
-            </a:extLst>
-          </p:cNvPr>
-          <p:cNvSpPr/>
-          <p:nvPr/>
-        </p:nvSpPr>
-        <p:spPr>
-          <a:xfrm>
-            <a:off x="5835804" y="1923167"/>
-            <a:ext cx="498600" cy="498600"/>
-          </a:xfrm>
-          <a:prstGeom prst="ellipse">
-            <a:avLst/>
-          </a:prstGeom>
-          <a:noFill/>
-          <a:ln>
-            <a:noFill/>
-          </a:ln>
-        </p:spPr>
-        <p:txBody>
-          <a:bodyPr spcFirstLastPara="1" wrap="square" lIns="91425" tIns="91425" rIns="91425" bIns="91425" anchor="ctr" anchorCtr="0">
-            <a:noAutofit/>
-          </a:bodyPr>
-          <a:lstStyle/>
-          <a:p>
-            <a:pPr marL="0" lvl="0" indent="0" algn="l" rtl="0">
-              <a:spcBef>
-                <a:spcPts val="0"/>
-              </a:spcBef>
-              <a:spcAft>
-                <a:spcPts val="0"/>
-              </a:spcAft>
-              <a:buNone/>
-            </a:pPr>
-            <a:endParaRPr/>
-          </a:p>
-        </p:txBody>
-      </p:sp>
-      <p:sp>
-        <p:nvSpPr>
-          <p:cNvPr id="129" name="Google Shape;235;p36">
-            <a:extLst>
-              <a:ext uri="{FF2B5EF4-FFF2-40B4-BE49-F238E27FC236}">
-                <a16:creationId xmlns:a16="http://schemas.microsoft.com/office/drawing/2014/main" id="{7924555E-D160-8FDA-A5ED-3CC443E00C59}"/>
-              </a:ext>
-            </a:extLst>
-          </p:cNvPr>
-          <p:cNvSpPr/>
-          <p:nvPr/>
-        </p:nvSpPr>
-        <p:spPr>
-          <a:xfrm>
-            <a:off x="5913054" y="1676009"/>
-            <a:ext cx="766200" cy="762000"/>
-          </a:xfrm>
-          <a:prstGeom prst="roundRect">
-            <a:avLst>
-              <a:gd name="adj" fmla="val 16667"/>
-            </a:avLst>
-          </a:prstGeom>
-          <a:solidFill>
-            <a:schemeClr val="lt2"/>
-          </a:solidFill>
-          <a:ln>
-            <a:noFill/>
-          </a:ln>
-        </p:spPr>
-        <p:txBody>
-          <a:bodyPr spcFirstLastPara="1" wrap="square" lIns="91425" tIns="91425" rIns="91425" bIns="91425" anchor="ctr" anchorCtr="0">
-            <a:noAutofit/>
-          </a:bodyPr>
-          <a:lstStyle/>
-          <a:p>
-            <a:pPr marL="0" lvl="0" indent="0" algn="l" rtl="0">
-              <a:spcBef>
-                <a:spcPts val="0"/>
-              </a:spcBef>
-              <a:spcAft>
-                <a:spcPts val="0"/>
-              </a:spcAft>
-              <a:buNone/>
-            </a:pPr>
-            <a:endParaRPr/>
-          </a:p>
-        </p:txBody>
-      </p:sp>
-      <p:sp>
-        <p:nvSpPr>
-          <p:cNvPr id="130" name="Google Shape;241;p36">
-            <a:extLst>
-              <a:ext uri="{FF2B5EF4-FFF2-40B4-BE49-F238E27FC236}">
-                <a16:creationId xmlns:a16="http://schemas.microsoft.com/office/drawing/2014/main" id="{E6AB7BE9-B809-CA49-1F5D-AF0D173E9046}"/>
-              </a:ext>
-            </a:extLst>
-          </p:cNvPr>
-          <p:cNvSpPr txBox="1"/>
-          <p:nvPr/>
-        </p:nvSpPr>
-        <p:spPr>
-          <a:xfrm>
-            <a:off x="5407016" y="3096561"/>
-            <a:ext cx="1777076" cy="809400"/>
-          </a:xfrm>
-          <a:prstGeom prst="rect">
-            <a:avLst/>
-          </a:prstGeom>
-          <a:noFill/>
-          <a:ln>
-            <a:noFill/>
-          </a:ln>
-        </p:spPr>
-        <p:txBody>
-          <a:bodyPr spcFirstLastPara="1" wrap="square" lIns="91425" tIns="91425" rIns="91425" bIns="91425" anchor="t" anchorCtr="0">
-            <a:noAutofit/>
-          </a:bodyPr>
-          <a:lstStyle/>
-          <a:p>
-            <a:pPr lvl="0" algn="ctr"/>
-            <a:r>
-              <a:rPr lang="en-US" dirty="0">
-                <a:solidFill>
-                  <a:schemeClr val="dk1"/>
-                </a:solidFill>
-                <a:latin typeface="Lato"/>
-                <a:ea typeface="Lato"/>
-                <a:cs typeface="Lato"/>
-                <a:sym typeface="Lato"/>
-              </a:rPr>
-              <a:t>Reliable and skilled lawn mowing service providers</a:t>
-            </a:r>
-          </a:p>
-          <a:p>
-            <a:pPr lvl="0" algn="ctr"/>
-            <a:endParaRPr lang="en-US" dirty="0">
-              <a:solidFill>
-                <a:schemeClr val="dk1"/>
-              </a:solidFill>
-              <a:latin typeface="Lato"/>
-              <a:ea typeface="Lato"/>
-              <a:cs typeface="Lato"/>
-              <a:sym typeface="Lato"/>
-            </a:endParaRPr>
-          </a:p>
-        </p:txBody>
-      </p:sp>
-      <p:cxnSp>
-        <p:nvCxnSpPr>
-          <p:cNvPr id="131" name="Google Shape;244;p36">
-            <a:extLst>
-              <a:ext uri="{FF2B5EF4-FFF2-40B4-BE49-F238E27FC236}">
-                <a16:creationId xmlns:a16="http://schemas.microsoft.com/office/drawing/2014/main" id="{994F0642-67D7-A4A4-504C-B6EEFB426774}"/>
-              </a:ext>
-            </a:extLst>
-          </p:cNvPr>
-          <p:cNvCxnSpPr>
-            <a:cxnSpLocks/>
-            <a:stCxn id="129" idx="2"/>
-          </p:cNvCxnSpPr>
-          <p:nvPr/>
-        </p:nvCxnSpPr>
-        <p:spPr>
-          <a:xfrm flipH="1">
-            <a:off x="6295554" y="2438009"/>
-            <a:ext cx="600" cy="544500"/>
-          </a:xfrm>
-          <a:prstGeom prst="straightConnector1">
-            <a:avLst/>
-          </a:prstGeom>
-          <a:noFill/>
-          <a:ln w="19050" cap="flat" cmpd="sng">
-            <a:solidFill>
-              <a:schemeClr val="dk1"/>
-            </a:solidFill>
-            <a:prstDash val="solid"/>
-            <a:round/>
-            <a:headEnd type="none" w="med" len="med"/>
-            <a:tailEnd type="none" w="med" len="med"/>
-          </a:ln>
-        </p:spPr>
-      </p:cxnSp>
-      <p:pic>
-        <p:nvPicPr>
-          <p:cNvPr id="135" name="Picture 134">
-            <a:extLst>
-              <a:ext uri="{FF2B5EF4-FFF2-40B4-BE49-F238E27FC236}">
-                <a16:creationId xmlns:a16="http://schemas.microsoft.com/office/drawing/2014/main" id="{C382288C-B77C-0570-F116-941A5D66793A}"/>
-              </a:ext>
-            </a:extLst>
-          </p:cNvPr>
-          <p:cNvPicPr>
-            <a:picLocks noChangeAspect="1"/>
-          </p:cNvPicPr>
-          <p:nvPr/>
-        </p:nvPicPr>
-        <p:blipFill>
-          <a:blip r:embed="rId4"/>
-          <a:stretch>
-            <a:fillRect/>
-          </a:stretch>
-        </p:blipFill>
-        <p:spPr>
-          <a:xfrm>
-            <a:off x="2654624" y="1869557"/>
-            <a:ext cx="374904" cy="374904"/>
-          </a:xfrm>
-          <a:prstGeom prst="rect">
-            <a:avLst/>
-          </a:prstGeom>
-        </p:spPr>
-      </p:pic>
-      <p:pic>
-        <p:nvPicPr>
-          <p:cNvPr id="139" name="Picture 138">
-            <a:extLst>
-              <a:ext uri="{FF2B5EF4-FFF2-40B4-BE49-F238E27FC236}">
-                <a16:creationId xmlns:a16="http://schemas.microsoft.com/office/drawing/2014/main" id="{7C2E5041-C34B-8CA2-2354-0A3149570BCF}"/>
-              </a:ext>
-            </a:extLst>
-          </p:cNvPr>
-          <p:cNvPicPr>
-            <a:picLocks noChangeAspect="1"/>
-          </p:cNvPicPr>
-          <p:nvPr/>
-        </p:nvPicPr>
-        <p:blipFill>
-          <a:blip r:embed="rId5"/>
-          <a:stretch>
-            <a:fillRect/>
-          </a:stretch>
-        </p:blipFill>
-        <p:spPr>
-          <a:xfrm>
-            <a:off x="4374668" y="1869557"/>
-            <a:ext cx="374904" cy="374904"/>
-          </a:xfrm>
-          <a:prstGeom prst="rect">
-            <a:avLst/>
-          </a:prstGeom>
-        </p:spPr>
-      </p:pic>
-      <p:pic>
-        <p:nvPicPr>
-          <p:cNvPr id="141" name="Picture 140">
-            <a:extLst>
-              <a:ext uri="{FF2B5EF4-FFF2-40B4-BE49-F238E27FC236}">
-                <a16:creationId xmlns:a16="http://schemas.microsoft.com/office/drawing/2014/main" id="{BDC9B77E-D67F-E612-40D8-585D2BB71F6C}"/>
-              </a:ext>
-            </a:extLst>
-          </p:cNvPr>
-          <p:cNvPicPr>
-            <a:picLocks noChangeAspect="1"/>
-          </p:cNvPicPr>
-          <p:nvPr/>
-        </p:nvPicPr>
-        <p:blipFill>
-          <a:blip r:embed="rId6"/>
-          <a:stretch>
-            <a:fillRect/>
-          </a:stretch>
-        </p:blipFill>
-        <p:spPr>
-          <a:xfrm>
-            <a:off x="6108102" y="1869557"/>
-            <a:ext cx="374904" cy="374904"/>
-          </a:xfrm>
-          <a:prstGeom prst="rect">
-            <a:avLst/>
-          </a:prstGeom>
-        </p:spPr>
-      </p:pic>
-      <p:pic>
-        <p:nvPicPr>
-          <p:cNvPr id="142" name="Picture 141">
-            <a:extLst>
-              <a:ext uri="{FF2B5EF4-FFF2-40B4-BE49-F238E27FC236}">
-                <a16:creationId xmlns:a16="http://schemas.microsoft.com/office/drawing/2014/main" id="{B0C7EC74-F287-5582-791D-93A8DC8B056B}"/>
-              </a:ext>
-            </a:extLst>
-          </p:cNvPr>
-          <p:cNvPicPr>
-            <a:picLocks noChangeAspect="1"/>
-          </p:cNvPicPr>
-          <p:nvPr/>
-        </p:nvPicPr>
-        <p:blipFill>
-          <a:blip r:embed="rId7"/>
-          <a:stretch>
-            <a:fillRect/>
-          </a:stretch>
-        </p:blipFill>
-        <p:spPr>
-          <a:xfrm>
-            <a:off x="7760579" y="1869557"/>
-            <a:ext cx="374904" cy="374904"/>
-          </a:xfrm>
-          <a:prstGeom prst="rect">
-            <a:avLst/>
-          </a:prstGeom>
-        </p:spPr>
-      </p:pic>
+              <a:prstDash val="solid"/>
+              <a:round/>
+              <a:headEnd type="none" w="med" len="med"/>
+              <a:tailEnd type="none" w="med" len="med"/>
+            </a:ln>
+          </p:spPr>
+        </p:cxnSp>
+        <p:pic>
+          <p:nvPicPr>
+            <p:cNvPr id="135" name="Picture 134">
+              <a:extLst>
+                <a:ext uri="{FF2B5EF4-FFF2-40B4-BE49-F238E27FC236}">
+                  <a16:creationId xmlns:a16="http://schemas.microsoft.com/office/drawing/2014/main" id="{C382288C-B77C-0570-F116-941A5D66793A}"/>
+                </a:ext>
+              </a:extLst>
+            </p:cNvPr>
+            <p:cNvPicPr>
+              <a:picLocks noChangeAspect="1"/>
+            </p:cNvPicPr>
+            <p:nvPr/>
+          </p:nvPicPr>
+          <p:blipFill>
+            <a:blip r:embed="rId4"/>
+            <a:stretch>
+              <a:fillRect/>
+            </a:stretch>
+          </p:blipFill>
+          <p:spPr>
+            <a:xfrm>
+              <a:off x="2652196" y="1314672"/>
+              <a:ext cx="374904" cy="374904"/>
+            </a:xfrm>
+            <a:prstGeom prst="rect">
+              <a:avLst/>
+            </a:prstGeom>
+          </p:spPr>
+        </p:pic>
+        <p:pic>
+          <p:nvPicPr>
+            <p:cNvPr id="139" name="Picture 138">
+              <a:extLst>
+                <a:ext uri="{FF2B5EF4-FFF2-40B4-BE49-F238E27FC236}">
+                  <a16:creationId xmlns:a16="http://schemas.microsoft.com/office/drawing/2014/main" id="{7C2E5041-C34B-8CA2-2354-0A3149570BCF}"/>
+                </a:ext>
+              </a:extLst>
+            </p:cNvPr>
+            <p:cNvPicPr>
+              <a:picLocks noChangeAspect="1"/>
+            </p:cNvPicPr>
+            <p:nvPr/>
+          </p:nvPicPr>
+          <p:blipFill>
+            <a:blip r:embed="rId5"/>
+            <a:stretch>
+              <a:fillRect/>
+            </a:stretch>
+          </p:blipFill>
+          <p:spPr>
+            <a:xfrm>
+              <a:off x="4372240" y="1314672"/>
+              <a:ext cx="374904" cy="374904"/>
+            </a:xfrm>
+            <a:prstGeom prst="rect">
+              <a:avLst/>
+            </a:prstGeom>
+          </p:spPr>
+        </p:pic>
+        <p:pic>
+          <p:nvPicPr>
+            <p:cNvPr id="141" name="Picture 140">
+              <a:extLst>
+                <a:ext uri="{FF2B5EF4-FFF2-40B4-BE49-F238E27FC236}">
+                  <a16:creationId xmlns:a16="http://schemas.microsoft.com/office/drawing/2014/main" id="{BDC9B77E-D67F-E612-40D8-585D2BB71F6C}"/>
+                </a:ext>
+              </a:extLst>
+            </p:cNvPr>
+            <p:cNvPicPr>
+              <a:picLocks noChangeAspect="1"/>
+            </p:cNvPicPr>
+            <p:nvPr/>
+          </p:nvPicPr>
+          <p:blipFill>
+            <a:blip r:embed="rId6"/>
+            <a:stretch>
+              <a:fillRect/>
+            </a:stretch>
+          </p:blipFill>
+          <p:spPr>
+            <a:xfrm>
+              <a:off x="6105674" y="1314672"/>
+              <a:ext cx="374904" cy="374904"/>
+            </a:xfrm>
+            <a:prstGeom prst="rect">
+              <a:avLst/>
+            </a:prstGeom>
+          </p:spPr>
+        </p:pic>
+        <p:pic>
+          <p:nvPicPr>
+            <p:cNvPr id="142" name="Picture 141">
+              <a:extLst>
+                <a:ext uri="{FF2B5EF4-FFF2-40B4-BE49-F238E27FC236}">
+                  <a16:creationId xmlns:a16="http://schemas.microsoft.com/office/drawing/2014/main" id="{B0C7EC74-F287-5582-791D-93A8DC8B056B}"/>
+                </a:ext>
+              </a:extLst>
+            </p:cNvPr>
+            <p:cNvPicPr>
+              <a:picLocks noChangeAspect="1"/>
+            </p:cNvPicPr>
+            <p:nvPr/>
+          </p:nvPicPr>
+          <p:blipFill>
+            <a:blip r:embed="rId7"/>
+            <a:stretch>
+              <a:fillRect/>
+            </a:stretch>
+          </p:blipFill>
+          <p:spPr>
+            <a:xfrm>
+              <a:off x="7758151" y="1314672"/>
+              <a:ext cx="374904" cy="374904"/>
+            </a:xfrm>
+            <a:prstGeom prst="rect">
+              <a:avLst/>
+            </a:prstGeom>
+          </p:spPr>
+        </p:pic>
+      </p:grpSp>
       <p:pic>
         <p:nvPicPr>
           <p:cNvPr id="4" name="Google Shape;175;p29">
@@ -31574,143 +31622,251 @@
           </a:ln>
         </p:spPr>
       </p:pic>
+      <p:sp>
+        <p:nvSpPr>
+          <p:cNvPr id="7" name="TextBox 6">
+            <a:extLst>
+              <a:ext uri="{FF2B5EF4-FFF2-40B4-BE49-F238E27FC236}">
+                <a16:creationId xmlns:a16="http://schemas.microsoft.com/office/drawing/2014/main" id="{9066B4C4-0E76-082D-5E1E-AC69EA59FC9A}"/>
+              </a:ext>
+            </a:extLst>
+          </p:cNvPr>
+          <p:cNvSpPr txBox="1"/>
+          <p:nvPr/>
+        </p:nvSpPr>
+        <p:spPr>
+          <a:xfrm>
+            <a:off x="296094" y="3160328"/>
+            <a:ext cx="1754701" cy="1077218"/>
+          </a:xfrm>
+          <a:prstGeom prst="rect">
+            <a:avLst/>
+          </a:prstGeom>
+          <a:noFill/>
+        </p:spPr>
+        <p:txBody>
+          <a:bodyPr wrap="square">
+            <a:spAutoFit/>
+          </a:bodyPr>
+          <a:lstStyle/>
+          <a:p>
+            <a:pPr algn="ctr"/>
+            <a:r>
+              <a:rPr lang="en-US" sz="800" dirty="0">
+                <a:latin typeface="Lato" panose="020F0502020204030203" pitchFamily="34" charset="0"/>
+                <a:ea typeface="Lato" panose="020F0502020204030203" pitchFamily="34" charset="0"/>
+                <a:cs typeface="Lato" panose="020F0502020204030203" pitchFamily="34" charset="0"/>
+              </a:rPr>
+              <a:t>Lawn Buddy's cutting-edge AI technology revolutionizes lawn mowing scheduling. By analyzing lawn size, grass growth patterns, and local weather conditions, our algorithms ensure optimal mowing schedules, guaranteeing efficient and timely service without hassle.</a:t>
+            </a:r>
+          </a:p>
+        </p:txBody>
+      </p:sp>
+      <p:sp>
+        <p:nvSpPr>
+          <p:cNvPr id="10" name="TextBox 9">
+            <a:extLst>
+              <a:ext uri="{FF2B5EF4-FFF2-40B4-BE49-F238E27FC236}">
+                <a16:creationId xmlns:a16="http://schemas.microsoft.com/office/drawing/2014/main" id="{B1038DFC-D469-AB52-0665-C8BC0209B68D}"/>
+              </a:ext>
+            </a:extLst>
+          </p:cNvPr>
+          <p:cNvSpPr txBox="1"/>
+          <p:nvPr/>
+        </p:nvSpPr>
+        <p:spPr>
+          <a:xfrm>
+            <a:off x="2039102" y="3160328"/>
+            <a:ext cx="1754701" cy="1077218"/>
+          </a:xfrm>
+          <a:prstGeom prst="rect">
+            <a:avLst/>
+          </a:prstGeom>
+          <a:noFill/>
+        </p:spPr>
+        <p:txBody>
+          <a:bodyPr wrap="square">
+            <a:spAutoFit/>
+          </a:bodyPr>
+          <a:lstStyle/>
+          <a:p>
+            <a:pPr algn="ctr"/>
+            <a:r>
+              <a:rPr lang="en-US" sz="800" dirty="0">
+                <a:latin typeface="Lato" panose="020F0502020204030203" pitchFamily="34" charset="0"/>
+                <a:ea typeface="Lato" panose="020F0502020204030203" pitchFamily="34" charset="0"/>
+                <a:cs typeface="Lato" panose="020F0502020204030203" pitchFamily="34" charset="0"/>
+              </a:rPr>
+              <a:t>Our platform automates lawn care, freeing customers from manual effort. AI-guided scheduling and skilled professionals mean homeowners can enjoy a perfectly mowed lawn without investing their precious time, allowing them to focus on what truly matters.</a:t>
+            </a:r>
+          </a:p>
+        </p:txBody>
+      </p:sp>
+      <p:sp>
+        <p:nvSpPr>
+          <p:cNvPr id="11" name="TextBox 10">
+            <a:extLst>
+              <a:ext uri="{FF2B5EF4-FFF2-40B4-BE49-F238E27FC236}">
+                <a16:creationId xmlns:a16="http://schemas.microsoft.com/office/drawing/2014/main" id="{EE58ECFB-BC15-D45D-492F-7E415BA7A311}"/>
+              </a:ext>
+            </a:extLst>
+          </p:cNvPr>
+          <p:cNvSpPr txBox="1"/>
+          <p:nvPr/>
+        </p:nvSpPr>
+        <p:spPr>
+          <a:xfrm>
+            <a:off x="3723245" y="3160328"/>
+            <a:ext cx="1754701" cy="1077218"/>
+          </a:xfrm>
+          <a:prstGeom prst="rect">
+            <a:avLst/>
+          </a:prstGeom>
+          <a:noFill/>
+        </p:spPr>
+        <p:txBody>
+          <a:bodyPr wrap="square">
+            <a:spAutoFit/>
+          </a:bodyPr>
+          <a:lstStyle/>
+          <a:p>
+            <a:pPr algn="ctr"/>
+            <a:r>
+              <a:rPr lang="en-US" sz="800" dirty="0">
+                <a:latin typeface="Lato" panose="020F0502020204030203" pitchFamily="34" charset="0"/>
+                <a:ea typeface="Lato" panose="020F0502020204030203" pitchFamily="34" charset="0"/>
+                <a:cs typeface="Lato" panose="020F0502020204030203" pitchFamily="34" charset="0"/>
+              </a:rPr>
+              <a:t>Lawn Buddy offers a new level of personalization. We create custom lawn care plans by considering unique characteristics like size, location, and specific needs. This approach guarantees that every lawn receives the individualized attention it deserves.</a:t>
+            </a:r>
+          </a:p>
+        </p:txBody>
+      </p:sp>
+      <p:sp>
+        <p:nvSpPr>
+          <p:cNvPr id="12" name="TextBox 11">
+            <a:extLst>
+              <a:ext uri="{FF2B5EF4-FFF2-40B4-BE49-F238E27FC236}">
+                <a16:creationId xmlns:a16="http://schemas.microsoft.com/office/drawing/2014/main" id="{A2AD54E9-5537-4533-9151-DB4C1EAED5E4}"/>
+              </a:ext>
+            </a:extLst>
+          </p:cNvPr>
+          <p:cNvSpPr txBox="1"/>
+          <p:nvPr/>
+        </p:nvSpPr>
+        <p:spPr>
+          <a:xfrm>
+            <a:off x="5459459" y="3160328"/>
+            <a:ext cx="1754701" cy="954107"/>
+          </a:xfrm>
+          <a:prstGeom prst="rect">
+            <a:avLst/>
+          </a:prstGeom>
+          <a:noFill/>
+        </p:spPr>
+        <p:txBody>
+          <a:bodyPr wrap="square">
+            <a:spAutoFit/>
+          </a:bodyPr>
+          <a:lstStyle/>
+          <a:p>
+            <a:pPr algn="ctr"/>
+            <a:r>
+              <a:rPr lang="en-US" sz="800" dirty="0">
+                <a:latin typeface="Lato" panose="020F0502020204030203" pitchFamily="34" charset="0"/>
+                <a:ea typeface="Lato" panose="020F0502020204030203" pitchFamily="34" charset="0"/>
+                <a:cs typeface="Lato" panose="020F0502020204030203" pitchFamily="34" charset="0"/>
+              </a:rPr>
+              <a:t>Trust is paramount, which is why we've built a network of proficient lawn mowing professionals. With their expertise, customers can rest assured that their lawns are in reliable care, fostering a sense of confidence and satisfaction.</a:t>
+            </a:r>
+          </a:p>
+        </p:txBody>
+      </p:sp>
+      <p:sp>
+        <p:nvSpPr>
+          <p:cNvPr id="13" name="TextBox 12">
+            <a:extLst>
+              <a:ext uri="{FF2B5EF4-FFF2-40B4-BE49-F238E27FC236}">
+                <a16:creationId xmlns:a16="http://schemas.microsoft.com/office/drawing/2014/main" id="{BCD4417C-4FF7-419A-7C07-387999E8D858}"/>
+              </a:ext>
+            </a:extLst>
+          </p:cNvPr>
+          <p:cNvSpPr txBox="1"/>
+          <p:nvPr/>
+        </p:nvSpPr>
+        <p:spPr>
+          <a:xfrm>
+            <a:off x="7118374" y="3160328"/>
+            <a:ext cx="1754701" cy="1077218"/>
+          </a:xfrm>
+          <a:prstGeom prst="rect">
+            <a:avLst/>
+          </a:prstGeom>
+          <a:noFill/>
+        </p:spPr>
+        <p:txBody>
+          <a:bodyPr wrap="square">
+            <a:spAutoFit/>
+          </a:bodyPr>
+          <a:lstStyle/>
+          <a:p>
+            <a:pPr algn="ctr"/>
+            <a:r>
+              <a:rPr lang="en-US" sz="800" dirty="0">
+                <a:latin typeface="Lato" panose="020F0502020204030203" pitchFamily="34" charset="0"/>
+                <a:ea typeface="Lato" panose="020F0502020204030203" pitchFamily="34" charset="0"/>
+                <a:cs typeface="Lato" panose="020F0502020204030203" pitchFamily="34" charset="0"/>
+              </a:rPr>
+              <a:t>Lawn Buddy stands out with real-time updates and notifications. From service provider progress alerts to task completion notifications, our transparent communication ensures customers are well-informed and engaged throughout the process.</a:t>
+            </a:r>
+          </a:p>
+        </p:txBody>
+      </p:sp>
+      <p:sp>
+        <p:nvSpPr>
+          <p:cNvPr id="15" name="TextBox 14">
+            <a:extLst>
+              <a:ext uri="{FF2B5EF4-FFF2-40B4-BE49-F238E27FC236}">
+                <a16:creationId xmlns:a16="http://schemas.microsoft.com/office/drawing/2014/main" id="{2A182650-82C4-0E29-441C-54D6016DBB6D}"/>
+              </a:ext>
+            </a:extLst>
+          </p:cNvPr>
+          <p:cNvSpPr txBox="1"/>
+          <p:nvPr/>
+        </p:nvSpPr>
+        <p:spPr>
+          <a:xfrm>
+            <a:off x="1159734" y="4428142"/>
+            <a:ext cx="6824532" cy="507831"/>
+          </a:xfrm>
+          <a:prstGeom prst="rect">
+            <a:avLst/>
+          </a:prstGeom>
+          <a:noFill/>
+        </p:spPr>
+        <p:txBody>
+          <a:bodyPr wrap="square">
+            <a:spAutoFit/>
+          </a:bodyPr>
+          <a:lstStyle/>
+          <a:p>
+            <a:pPr algn="ctr"/>
+            <a:r>
+              <a:rPr lang="en-US" sz="900" i="1" dirty="0">
+                <a:latin typeface="Lato" panose="020F0502020204030203" pitchFamily="34" charset="0"/>
+                <a:ea typeface="Lato" panose="020F0502020204030203" pitchFamily="34" charset="0"/>
+                <a:cs typeface="Lato" panose="020F0502020204030203" pitchFamily="34" charset="0"/>
+              </a:rPr>
+              <a:t>In summary, Lawn Buddy's venture concept is centered around offering a convenient, efficient, and personalized lawn care experience. Through AI-driven scheduling, time-saving automation, tailored care plans, reliable professionals, and real-time updates, we are reshaping the way homeowners enjoy the beauty of their outdoor spaces.</a:t>
+            </a:r>
+          </a:p>
+        </p:txBody>
+      </p:sp>
     </p:spTree>
   </p:cSld>
   <p:clrMapOvr>
     <a:masterClrMapping/>
   </p:clrMapOvr>
-  <p:timing>
-    <p:tnLst>
-      <p:par>
-        <p:cTn id="1" dur="indefinite" restart="never" nodeType="tmRoot">
-          <p:childTnLst>
-            <p:seq concurrent="1" nextAc="seek">
-              <p:cTn id="2" dur="indefinite" nodeType="mainSeq">
-                <p:childTnLst>
-                  <p:par>
-                    <p:cTn id="3" fill="hold">
-                      <p:stCondLst>
-                        <p:cond delay="indefinite"/>
-                      </p:stCondLst>
-                      <p:childTnLst>
-                        <p:par>
-                          <p:cTn id="4" fill="hold">
-                            <p:stCondLst>
-                              <p:cond delay="0"/>
-                            </p:stCondLst>
-                            <p:childTnLst>
-                              <p:par>
-                                <p:cTn id="5" presetID="42" presetClass="entr" presetSubtype="0" fill="hold" grpId="0" nodeType="clickEffect">
-                                  <p:stCondLst>
-                                    <p:cond delay="0"/>
-                                  </p:stCondLst>
-                                  <p:childTnLst>
-                                    <p:set>
-                                      <p:cBhvr>
-                                        <p:cTn id="6" dur="1" fill="hold">
-                                          <p:stCondLst>
-                                            <p:cond delay="0"/>
-                                          </p:stCondLst>
-                                        </p:cTn>
-                                        <p:tgtEl>
-                                          <p:spTgt spid="38"/>
-                                        </p:tgtEl>
-                                        <p:attrNameLst>
-                                          <p:attrName>style.visibility</p:attrName>
-                                        </p:attrNameLst>
-                                      </p:cBhvr>
-                                      <p:to>
-                                        <p:strVal val="visible"/>
-                                      </p:to>
-                                    </p:set>
-                                    <p:animEffect transition="in" filter="fade">
-                                      <p:cBhvr>
-                                        <p:cTn id="7" dur="1000"/>
-                                        <p:tgtEl>
-                                          <p:spTgt spid="38"/>
-                                        </p:tgtEl>
-                                      </p:cBhvr>
-                                    </p:animEffect>
-                                    <p:anim calcmode="lin" valueType="num">
-                                      <p:cBhvr>
-                                        <p:cTn id="8" dur="1000" fill="hold"/>
-                                        <p:tgtEl>
-                                          <p:spTgt spid="38"/>
-                                        </p:tgtEl>
-                                        <p:attrNameLst>
-                                          <p:attrName>ppt_x</p:attrName>
-                                        </p:attrNameLst>
-                                      </p:cBhvr>
-                                      <p:tavLst>
-                                        <p:tav tm="0">
-                                          <p:val>
-                                            <p:strVal val="#ppt_x"/>
-                                          </p:val>
-                                        </p:tav>
-                                        <p:tav tm="100000">
-                                          <p:val>
-                                            <p:strVal val="#ppt_x"/>
-                                          </p:val>
-                                        </p:tav>
-                                      </p:tavLst>
-                                    </p:anim>
-                                    <p:anim calcmode="lin" valueType="num">
-                                      <p:cBhvr>
-                                        <p:cTn id="9" dur="1000" fill="hold"/>
-                                        <p:tgtEl>
-                                          <p:spTgt spid="38"/>
-                                        </p:tgtEl>
-                                        <p:attrNameLst>
-                                          <p:attrName>ppt_y</p:attrName>
-                                        </p:attrNameLst>
-                                      </p:cBhvr>
-                                      <p:tavLst>
-                                        <p:tav tm="0">
-                                          <p:val>
-                                            <p:strVal val="#ppt_y+.1"/>
-                                          </p:val>
-                                        </p:tav>
-                                        <p:tav tm="100000">
-                                          <p:val>
-                                            <p:strVal val="#ppt_y"/>
-                                          </p:val>
-                                        </p:tav>
-                                      </p:tavLst>
-                                    </p:anim>
-                                  </p:childTnLst>
-                                </p:cTn>
-                              </p:par>
-                            </p:childTnLst>
-                          </p:cTn>
-                        </p:par>
-                      </p:childTnLst>
-                    </p:cTn>
-                  </p:par>
-                </p:childTnLst>
-              </p:cTn>
-              <p:prevCondLst>
-                <p:cond evt="onPrev" delay="0">
-                  <p:tgtEl>
-                    <p:sldTgt/>
-                  </p:tgtEl>
-                </p:cond>
-              </p:prevCondLst>
-              <p:nextCondLst>
-                <p:cond evt="onNext" delay="0">
-                  <p:tgtEl>
-                    <p:sldTgt/>
-                  </p:tgtEl>
-                </p:cond>
-              </p:nextCondLst>
-            </p:seq>
-          </p:childTnLst>
-        </p:cTn>
-      </p:par>
-    </p:tnLst>
-    <p:bldLst>
-      <p:bldP spid="38" grpId="0"/>
-    </p:bldLst>
-  </p:timing>
 </p:sld>
 </file>
 
@@ -42705,10 +42861,17 @@
               </a:lnSpc>
             </a:pPr>
             <a:r>
-              <a:rPr lang="en-US" sz="1800" dirty="0"/>
+              <a:rPr lang="en-US" sz="1800" dirty="0">
+                <a:solidFill>
+                  <a:schemeClr val="tx1"/>
+                </a:solidFill>
+              </a:rPr>
               <a:t>Problem-Solution Fit &amp; Market Validation</a:t>
             </a:r>
             <a:endParaRPr sz="2000" dirty="0">
+              <a:solidFill>
+                <a:schemeClr val="tx1"/>
+              </a:solidFill>
               <a:latin typeface="Poppins" panose="00000500000000000000" pitchFamily="2" charset="0"/>
               <a:cs typeface="Poppins" panose="00000500000000000000" pitchFamily="2" charset="0"/>
             </a:endParaRPr>
@@ -42906,6 +43069,9 @@
                   <a:schemeClr val="tx1"/>
                 </a:solidFill>
               </a:ln>
+              <a:solidFill>
+                <a:schemeClr val="tx1"/>
+              </a:solidFill>
             </a:endParaRPr>
           </a:p>
         </p:txBody>
@@ -43191,7 +43357,11 @@
           <a:p>
             <a:pPr marL="0" indent="0" algn="l"/>
             <a:r>
-              <a:rPr lang="en-US" sz="900" dirty="0"/>
+              <a:rPr lang="en-US" sz="900" dirty="0">
+                <a:solidFill>
+                  <a:schemeClr val="tx1"/>
+                </a:solidFill>
+              </a:rPr>
               <a:t>Affordability and Pricing Sensitivity</a:t>
             </a:r>
           </a:p>
@@ -43482,11 +43652,19 @@
               <a:buChar char="•"/>
             </a:pPr>
             <a:r>
-              <a:rPr lang="en-US" sz="700" b="1" dirty="0"/>
+              <a:rPr lang="en-US" sz="700" b="1" dirty="0">
+                <a:solidFill>
+                  <a:schemeClr val="tx1"/>
+                </a:solidFill>
+              </a:rPr>
               <a:t>Transparent Pricing: </a:t>
             </a:r>
             <a:r>
-              <a:rPr lang="en-US" sz="700" dirty="0"/>
+              <a:rPr lang="en-US" sz="700" dirty="0">
+                <a:solidFill>
+                  <a:schemeClr val="tx1"/>
+                </a:solidFill>
+              </a:rPr>
               <a:t>Customers' preference for transparent pricing without hidden costs aligns with Lawn Buddy's commitment to straightforward and accessible pricing models.</a:t>
             </a:r>
           </a:p>
@@ -43496,7 +43674,11 @@
               <a:buFont typeface="Arial" panose="020B0604020202020204" pitchFamily="34" charset="0"/>
               <a:buChar char="•"/>
             </a:pPr>
-            <a:endParaRPr lang="en-US" sz="700" dirty="0"/>
+            <a:endParaRPr lang="en-US" sz="700" dirty="0">
+              <a:solidFill>
+                <a:schemeClr val="tx1"/>
+              </a:solidFill>
+            </a:endParaRPr>
           </a:p>
           <a:p>
             <a:pPr marL="171450" indent="-171450" algn="l">
@@ -43505,11 +43687,19 @@
               <a:buChar char="•"/>
             </a:pPr>
             <a:r>
-              <a:rPr lang="en-US" sz="700" b="1" dirty="0"/>
+              <a:rPr lang="en-US" sz="700" b="1" dirty="0">
+                <a:solidFill>
+                  <a:schemeClr val="tx1"/>
+                </a:solidFill>
+              </a:rPr>
               <a:t>Flexibility: </a:t>
             </a:r>
             <a:r>
-              <a:rPr lang="en-US" sz="700" dirty="0"/>
+              <a:rPr lang="en-US" sz="700" dirty="0">
+                <a:solidFill>
+                  <a:schemeClr val="tx1"/>
+                </a:solidFill>
+              </a:rPr>
               <a:t>The desire for flexible payment plans and rental options matches Lawn Buddy's consideration of diverse pricing structures to cater to different user needs.</a:t>
             </a:r>
           </a:p>
@@ -43796,7 +43986,11 @@
           <a:p>
             <a:pPr marL="0" indent="0" algn="l"/>
             <a:r>
-              <a:rPr lang="en-US" sz="900" dirty="0"/>
+              <a:rPr lang="en-US" sz="900" dirty="0">
+                <a:solidFill>
+                  <a:schemeClr val="tx1"/>
+                </a:solidFill>
+              </a:rPr>
               <a:t>Health Limitations &amp; Accessibility</a:t>
             </a:r>
           </a:p>
@@ -44087,11 +44281,19 @@
               <a:buChar char="•"/>
             </a:pPr>
             <a:r>
-              <a:rPr lang="en-US" sz="700" b="1" dirty="0"/>
+              <a:rPr lang="en-US" sz="700" b="1" dirty="0">
+                <a:solidFill>
+                  <a:schemeClr val="tx1"/>
+                </a:solidFill>
+              </a:rPr>
               <a:t>Health-Related Limitations: </a:t>
             </a:r>
             <a:r>
-              <a:rPr lang="en-US" sz="700" dirty="0"/>
+              <a:rPr lang="en-US" sz="700" dirty="0">
+                <a:solidFill>
+                  <a:schemeClr val="tx1"/>
+                </a:solidFill>
+              </a:rPr>
               <a:t>The data highlights health conditions such as respiratory issues, vision problems, and chronic fatigue affecting the ability to mow efficiently. Lawn Buddy's personalized care plans and adaptability cater to individuals with diverse health-related limitations.</a:t>
             </a:r>
           </a:p>
@@ -44101,7 +44303,11 @@
               <a:buFont typeface="Arial" panose="020B0604020202020204" pitchFamily="34" charset="0"/>
               <a:buChar char="•"/>
             </a:pPr>
-            <a:endParaRPr lang="en-US" sz="700" dirty="0"/>
+            <a:endParaRPr lang="en-US" sz="700" dirty="0">
+              <a:solidFill>
+                <a:schemeClr val="tx1"/>
+              </a:solidFill>
+            </a:endParaRPr>
           </a:p>
           <a:p>
             <a:pPr marL="171450" indent="-171450" algn="l">
@@ -44110,11 +44316,19 @@
               <a:buChar char="•"/>
             </a:pPr>
             <a:r>
-              <a:rPr lang="en-US" sz="700" b="1" dirty="0"/>
+              <a:rPr lang="en-US" sz="700" b="1" dirty="0">
+                <a:solidFill>
+                  <a:schemeClr val="tx1"/>
+                </a:solidFill>
+              </a:rPr>
               <a:t>Accessibility Enhancement: </a:t>
             </a:r>
             <a:r>
-              <a:rPr lang="en-US" sz="700" dirty="0"/>
+              <a:rPr lang="en-US" sz="700" dirty="0">
+                <a:solidFill>
+                  <a:schemeClr val="tx1"/>
+                </a:solidFill>
+              </a:rPr>
               <a:t>By providing remote monitoring and adaptable features, Lawn Buddy ensures that those with physical limitations can easily access and manage their lawn care.</a:t>
             </a:r>
           </a:p>
@@ -44401,7 +44615,11 @@
           <a:p>
             <a:pPr marL="0" indent="0" algn="l"/>
             <a:r>
-              <a:rPr lang="en-US" sz="900" dirty="0"/>
+              <a:rPr lang="en-US" sz="900" dirty="0">
+                <a:solidFill>
+                  <a:schemeClr val="tx1"/>
+                </a:solidFill>
+              </a:rPr>
               <a:t>Desired Features Aligned</a:t>
             </a:r>
           </a:p>
@@ -44692,11 +44910,19 @@
               <a:buChar char="•"/>
             </a:pPr>
             <a:r>
-              <a:rPr lang="en-US" sz="700" b="1" dirty="0"/>
+              <a:rPr lang="en-US" sz="700" b="1" dirty="0">
+                <a:solidFill>
+                  <a:schemeClr val="tx1"/>
+                </a:solidFill>
+              </a:rPr>
               <a:t>Automatic Obstacle Detection: </a:t>
             </a:r>
             <a:r>
-              <a:rPr lang="en-US" sz="700" dirty="0"/>
+              <a:rPr lang="en-US" sz="700" dirty="0">
+                <a:solidFill>
+                  <a:schemeClr val="tx1"/>
+                </a:solidFill>
+              </a:rPr>
               <a:t>Respondents' desire for automatic obstacle detection and avoidance resonates with Lawn Buddy's AI-powered obstacle recognition technology.</a:t>
             </a:r>
           </a:p>
@@ -44706,7 +44932,11 @@
               <a:buFont typeface="Arial" panose="020B0604020202020204" pitchFamily="34" charset="0"/>
               <a:buChar char="•"/>
             </a:pPr>
-            <a:endParaRPr lang="en-US" sz="700" dirty="0"/>
+            <a:endParaRPr lang="en-US" sz="700" dirty="0">
+              <a:solidFill>
+                <a:schemeClr val="tx1"/>
+              </a:solidFill>
+            </a:endParaRPr>
           </a:p>
           <a:p>
             <a:pPr marL="171450" indent="-171450" algn="l">
@@ -44715,11 +44945,19 @@
               <a:buChar char="•"/>
             </a:pPr>
             <a:r>
-              <a:rPr lang="en-US" sz="700" b="1" dirty="0"/>
+              <a:rPr lang="en-US" sz="700" b="1" dirty="0">
+                <a:solidFill>
+                  <a:schemeClr val="tx1"/>
+                </a:solidFill>
+              </a:rPr>
               <a:t>Weather-Based Scheduling</a:t>
             </a:r>
             <a:r>
-              <a:rPr lang="en-US" sz="700" dirty="0"/>
+              <a:rPr lang="en-US" sz="700" dirty="0">
+                <a:solidFill>
+                  <a:schemeClr val="tx1"/>
+                </a:solidFill>
+              </a:rPr>
               <a:t>: The emphasis on weather-based scheduling aligns with Lawn Buddy's intention to optimize schedules based on local weather conditions.</a:t>
             </a:r>
           </a:p>
@@ -44729,7 +44967,11 @@
               <a:buFont typeface="Arial" panose="020B0604020202020204" pitchFamily="34" charset="0"/>
               <a:buChar char="•"/>
             </a:pPr>
-            <a:endParaRPr lang="en-US" sz="700" dirty="0"/>
+            <a:endParaRPr lang="en-US" sz="700" dirty="0">
+              <a:solidFill>
+                <a:schemeClr val="tx1"/>
+              </a:solidFill>
+            </a:endParaRPr>
           </a:p>
           <a:p>
             <a:pPr marL="171450" indent="-171450" algn="l">
@@ -44738,11 +44980,19 @@
               <a:buChar char="•"/>
             </a:pPr>
             <a:r>
-              <a:rPr lang="en-US" sz="700" b="1" dirty="0"/>
+              <a:rPr lang="en-US" sz="700" b="1" dirty="0">
+                <a:solidFill>
+                  <a:schemeClr val="tx1"/>
+                </a:solidFill>
+              </a:rPr>
               <a:t>Real-Time Updates: </a:t>
             </a:r>
             <a:r>
-              <a:rPr lang="en-US" sz="700" dirty="0"/>
+              <a:rPr lang="en-US" sz="700" dirty="0">
+                <a:solidFill>
+                  <a:schemeClr val="tx1"/>
+                </a:solidFill>
+              </a:rPr>
               <a:t>The need for real-time updates and notifications corresponds to Lawn Buddy's commitment to keeping users informed about service progress.</a:t>
             </a:r>
           </a:p>
@@ -45029,7 +45279,11 @@
           <a:p>
             <a:pPr marL="0" indent="0" algn="l"/>
             <a:r>
-              <a:rPr lang="en-US" sz="900" dirty="0"/>
+              <a:rPr lang="en-US" sz="900" dirty="0">
+                <a:solidFill>
+                  <a:schemeClr val="tx1"/>
+                </a:solidFill>
+              </a:rPr>
               <a:t>Primary Customer Segment - Single-Family Residential</a:t>
             </a:r>
           </a:p>
@@ -45322,7 +45576,7 @@
             <a:r>
               <a:rPr lang="en-US" sz="700" b="1" i="0" dirty="0">
                 <a:solidFill>
-                  <a:srgbClr val="374151"/>
+                  <a:schemeClr val="tx1"/>
                 </a:solidFill>
                 <a:effectLst/>
                 <a:latin typeface="Lato" panose="020F0502020204030203" pitchFamily="34" charset="0"/>
@@ -45334,7 +45588,7 @@
             <a:r>
               <a:rPr lang="en-US" sz="700" b="0" i="0" dirty="0">
                 <a:solidFill>
-                  <a:srgbClr val="374151"/>
+                  <a:schemeClr val="tx1"/>
                 </a:solidFill>
                 <a:effectLst/>
                 <a:latin typeface="Lato" panose="020F0502020204030203" pitchFamily="34" charset="0"/>
@@ -45352,7 +45606,7 @@
             </a:pPr>
             <a:endParaRPr lang="en-US" sz="700" b="0" i="0" dirty="0">
               <a:solidFill>
-                <a:srgbClr val="374151"/>
+                <a:schemeClr val="tx1"/>
               </a:solidFill>
               <a:effectLst/>
               <a:latin typeface="Lato" panose="020F0502020204030203" pitchFamily="34" charset="0"/>
@@ -45369,7 +45623,7 @@
             <a:r>
               <a:rPr lang="en-US" sz="700" b="1" i="0" dirty="0">
                 <a:solidFill>
-                  <a:srgbClr val="374151"/>
+                  <a:schemeClr val="tx1"/>
                 </a:solidFill>
                 <a:effectLst/>
                 <a:latin typeface="Lato" panose="020F0502020204030203" pitchFamily="34" charset="0"/>
@@ -45381,7 +45635,7 @@
             <a:r>
               <a:rPr lang="en-US" sz="700" b="0" i="0" dirty="0">
                 <a:solidFill>
-                  <a:srgbClr val="374151"/>
+                  <a:schemeClr val="tx1"/>
                 </a:solidFill>
                 <a:effectLst/>
                 <a:latin typeface="Lato" panose="020F0502020204030203" pitchFamily="34" charset="0"/>
@@ -45391,6 +45645,9 @@
               <a:t>Commercial properties (24%), multi-family residential (11%), and governmental (5%) segments also contribute to the customer base, showing a diverse but central focus on single-family residential customers.</a:t>
             </a:r>
             <a:endParaRPr lang="en-US" sz="500" dirty="0">
+              <a:solidFill>
+                <a:schemeClr val="tx1"/>
+              </a:solidFill>
               <a:latin typeface="Lato" panose="020F0502020204030203" pitchFamily="34" charset="0"/>
               <a:ea typeface="Lato" panose="020F0502020204030203" pitchFamily="34" charset="0"/>
               <a:cs typeface="Lato" panose="020F0502020204030203" pitchFamily="34" charset="0"/>
@@ -45679,7 +45936,11 @@
           <a:p>
             <a:pPr marL="0" indent="0" algn="l"/>
             <a:r>
-              <a:rPr lang="en-US" sz="900" dirty="0"/>
+              <a:rPr lang="en-US" sz="900" dirty="0">
+                <a:solidFill>
+                  <a:schemeClr val="tx1"/>
+                </a:solidFill>
+              </a:rPr>
               <a:t>Target Demographic Validation - Age Group:</a:t>
             </a:r>
           </a:p>
@@ -45970,11 +46231,19 @@
               <a:buChar char="•"/>
             </a:pPr>
             <a:r>
-              <a:rPr lang="en-US" sz="700" b="1" dirty="0"/>
+              <a:rPr lang="en-US" sz="700" b="1" dirty="0">
+                <a:solidFill>
+                  <a:schemeClr val="tx1"/>
+                </a:solidFill>
+              </a:rPr>
               <a:t>Dominant Age Group: </a:t>
             </a:r>
             <a:r>
-              <a:rPr lang="en-US" sz="700" dirty="0"/>
+              <a:rPr lang="en-US" sz="700" dirty="0">
+                <a:solidFill>
+                  <a:schemeClr val="tx1"/>
+                </a:solidFill>
+              </a:rPr>
               <a:t>The age group of 50-64 years represents the largest share of respondents at 32.09%. This demographic alignment confirms that middle-aged and older individuals are actively engaged in and interested in lawn mowing activities.</a:t>
             </a:r>
           </a:p>
@@ -45984,7 +46253,11 @@
               <a:buFont typeface="Arial" panose="020B0604020202020204" pitchFamily="34" charset="0"/>
               <a:buChar char="•"/>
             </a:pPr>
-            <a:endParaRPr lang="en-US" sz="700" dirty="0"/>
+            <a:endParaRPr lang="en-US" sz="700" dirty="0">
+              <a:solidFill>
+                <a:schemeClr val="tx1"/>
+              </a:solidFill>
+            </a:endParaRPr>
           </a:p>
           <a:p>
             <a:pPr marL="171450" indent="-171450" algn="l">
@@ -45993,11 +46266,19 @@
               <a:buChar char="•"/>
             </a:pPr>
             <a:r>
-              <a:rPr lang="en-US" sz="700" b="1" dirty="0"/>
+              <a:rPr lang="en-US" sz="700" b="1" dirty="0">
+                <a:solidFill>
+                  <a:schemeClr val="tx1"/>
+                </a:solidFill>
+              </a:rPr>
               <a:t>Prime Working Years: </a:t>
             </a:r>
             <a:r>
-              <a:rPr lang="en-US" sz="700" dirty="0"/>
+              <a:rPr lang="en-US" sz="700" dirty="0">
+                <a:solidFill>
+                  <a:schemeClr val="tx1"/>
+                </a:solidFill>
+              </a:rPr>
               <a:t>The 30-49 years age group, accounting for 22.58% of respondents, indicates that individuals in their prime working years also have a significant presence in the lawn mowing market.</a:t>
             </a:r>
           </a:p>
@@ -46284,7 +46565,11 @@
           <a:p>
             <a:pPr marL="0" indent="0" algn="l"/>
             <a:r>
-              <a:rPr lang="en-US" sz="900" dirty="0"/>
+              <a:rPr lang="en-US" sz="900" dirty="0">
+                <a:solidFill>
+                  <a:schemeClr val="tx1"/>
+                </a:solidFill>
+              </a:rPr>
               <a:t>Growing Market Demand</a:t>
             </a:r>
           </a:p>
@@ -46575,11 +46860,19 @@
               <a:buChar char="•"/>
             </a:pPr>
             <a:r>
-              <a:rPr lang="en-US" sz="700" b="1" dirty="0"/>
+              <a:rPr lang="en-US" sz="700" b="1" dirty="0">
+                <a:solidFill>
+                  <a:schemeClr val="tx1"/>
+                </a:solidFill>
+              </a:rPr>
               <a:t>Market Growth: </a:t>
             </a:r>
             <a:r>
-              <a:rPr lang="en-US" sz="700" dirty="0"/>
+              <a:rPr lang="en-US" sz="700" dirty="0">
+                <a:solidFill>
+                  <a:schemeClr val="tx1"/>
+                </a:solidFill>
+              </a:rPr>
               <a:t>The lawn mowing market has consistently expanded, growing from 83.25 billion in 2013 to a substantial 176 billion in 2023. This growth trend indicates sustained demand for lawn care services.</a:t>
             </a:r>
           </a:p>
@@ -46589,7 +46882,11 @@
               <a:buFont typeface="Arial" panose="020B0604020202020204" pitchFamily="34" charset="0"/>
               <a:buChar char="•"/>
             </a:pPr>
-            <a:endParaRPr lang="en-US" sz="700" dirty="0"/>
+            <a:endParaRPr lang="en-US" sz="700" dirty="0">
+              <a:solidFill>
+                <a:schemeClr val="tx1"/>
+              </a:solidFill>
+            </a:endParaRPr>
           </a:p>
           <a:p>
             <a:pPr marL="171450" indent="-171450" algn="l">
@@ -46598,11 +46895,19 @@
               <a:buChar char="•"/>
             </a:pPr>
             <a:r>
-              <a:rPr lang="en-US" sz="700" b="1" dirty="0"/>
+              <a:rPr lang="en-US" sz="700" b="1" dirty="0">
+                <a:solidFill>
+                  <a:schemeClr val="tx1"/>
+                </a:solidFill>
+              </a:rPr>
               <a:t>Rapid Expansion: </a:t>
             </a:r>
             <a:r>
-              <a:rPr lang="en-US" sz="700" dirty="0"/>
+              <a:rPr lang="en-US" sz="700" dirty="0">
+                <a:solidFill>
+                  <a:schemeClr val="tx1"/>
+                </a:solidFill>
+              </a:rPr>
               <a:t>The acceleration of market growth from 119 billion in 2018 to 176 billion in 2023 showcases a surge in demand over recent years. This period of rapid expansion underscores the increasing need for efficient lawn maintenance solutions.</a:t>
             </a:r>
           </a:p>
@@ -46932,7 +47237,11 @@
           <a:p>
             <a:pPr marL="0" indent="0" algn="l"/>
             <a:r>
-              <a:rPr lang="en-US" sz="900" dirty="0"/>
+              <a:rPr lang="en-US" sz="900" dirty="0">
+                <a:solidFill>
+                  <a:schemeClr val="tx1"/>
+                </a:solidFill>
+              </a:rPr>
               <a:t>Challenges &amp; Pain Points Confirmed</a:t>
             </a:r>
           </a:p>
@@ -47225,7 +47534,7 @@
             <a:r>
               <a:rPr lang="en-US" sz="700" b="1" i="0" dirty="0">
                 <a:solidFill>
-                  <a:srgbClr val="374151"/>
+                  <a:schemeClr val="tx1"/>
                 </a:solidFill>
                 <a:effectLst/>
                 <a:latin typeface="Lato" panose="020F0502020204030203" pitchFamily="34" charset="0"/>
@@ -47237,7 +47546,7 @@
             <a:r>
               <a:rPr lang="en-US" sz="700" b="0" i="0" dirty="0">
                 <a:solidFill>
-                  <a:srgbClr val="374151"/>
+                  <a:schemeClr val="tx1"/>
                 </a:solidFill>
                 <a:effectLst/>
                 <a:latin typeface="Lato" panose="020F0502020204030203" pitchFamily="34" charset="0"/>
@@ -47255,7 +47564,7 @@
             </a:pPr>
             <a:endParaRPr lang="en-US" sz="700" b="0" i="0" dirty="0">
               <a:solidFill>
-                <a:srgbClr val="374151"/>
+                <a:schemeClr val="tx1"/>
               </a:solidFill>
               <a:effectLst/>
               <a:latin typeface="Lato" panose="020F0502020204030203" pitchFamily="34" charset="0"/>
@@ -47272,7 +47581,7 @@
             <a:r>
               <a:rPr lang="en-US" sz="700" b="1" i="0" dirty="0">
                 <a:solidFill>
-                  <a:srgbClr val="374151"/>
+                  <a:schemeClr val="tx1"/>
                 </a:solidFill>
                 <a:effectLst/>
                 <a:latin typeface="Lato" panose="020F0502020204030203" pitchFamily="34" charset="0"/>
@@ -47284,7 +47593,7 @@
             <a:r>
               <a:rPr lang="en-US" sz="700" b="0" i="0" dirty="0">
                 <a:solidFill>
-                  <a:srgbClr val="374151"/>
+                  <a:schemeClr val="tx1"/>
                 </a:solidFill>
                 <a:effectLst/>
                 <a:latin typeface="Lato" panose="020F0502020204030203" pitchFamily="34" charset="0"/>
@@ -47294,6 +47603,9 @@
               <a:t>Interviews reveal time-consuming aspects of lawn care, especially maneuvering around obstacles and dealing with post-mowing tasks. Lawn Buddy's optimization of scheduling and obstacle detection directly addresses these concerns.</a:t>
             </a:r>
             <a:endParaRPr lang="en-US" sz="500" dirty="0">
+              <a:solidFill>
+                <a:schemeClr val="tx1"/>
+              </a:solidFill>
               <a:latin typeface="Lato" panose="020F0502020204030203" pitchFamily="34" charset="0"/>
               <a:ea typeface="Lato" panose="020F0502020204030203" pitchFamily="34" charset="0"/>
               <a:cs typeface="Lato" panose="020F0502020204030203" pitchFamily="34" charset="0"/>
@@ -47582,7 +47894,11 @@
           <a:p>
             <a:pPr marL="0" indent="0" algn="l"/>
             <a:r>
-              <a:rPr lang="en-US" sz="900" dirty="0"/>
+              <a:rPr lang="en-US" sz="900" dirty="0">
+                <a:solidFill>
+                  <a:schemeClr val="tx1"/>
+                </a:solidFill>
+              </a:rPr>
               <a:t>Strong Problem-Solution Fit</a:t>
             </a:r>
           </a:p>
@@ -47875,7 +48191,7 @@
             <a:r>
               <a:rPr lang="en-US" sz="700" b="1" i="0" dirty="0">
                 <a:solidFill>
-                  <a:srgbClr val="374151"/>
+                  <a:schemeClr val="tx1"/>
                 </a:solidFill>
                 <a:effectLst/>
                 <a:latin typeface="Lato" panose="020F0502020204030203" pitchFamily="34" charset="0"/>
@@ -47887,7 +48203,7 @@
             <a:r>
               <a:rPr lang="en-US" sz="700" b="0" i="0" dirty="0">
                 <a:solidFill>
-                  <a:srgbClr val="374151"/>
+                  <a:schemeClr val="tx1"/>
                 </a:solidFill>
                 <a:effectLst/>
                 <a:latin typeface="Lato" panose="020F0502020204030203" pitchFamily="34" charset="0"/>
@@ -47905,7 +48221,7 @@
             </a:pPr>
             <a:endParaRPr lang="en-US" sz="700" b="0" i="0" dirty="0">
               <a:solidFill>
-                <a:srgbClr val="374151"/>
+                <a:schemeClr val="tx1"/>
               </a:solidFill>
               <a:effectLst/>
               <a:latin typeface="Lato" panose="020F0502020204030203" pitchFamily="34" charset="0"/>
@@ -47922,7 +48238,7 @@
             <a:r>
               <a:rPr lang="en-US" sz="700" b="1" i="0" dirty="0">
                 <a:solidFill>
-                  <a:srgbClr val="374151"/>
+                  <a:schemeClr val="tx1"/>
                 </a:solidFill>
                 <a:effectLst/>
                 <a:latin typeface="Lato" panose="020F0502020204030203" pitchFamily="34" charset="0"/>
@@ -47934,7 +48250,7 @@
             <a:r>
               <a:rPr lang="en-US" sz="700" b="0" i="0" dirty="0">
                 <a:solidFill>
-                  <a:srgbClr val="374151"/>
+                  <a:schemeClr val="tx1"/>
                 </a:solidFill>
                 <a:effectLst/>
                 <a:latin typeface="Lato" panose="020F0502020204030203" pitchFamily="34" charset="0"/>

</xml_diff>